<commit_message>
updated powerpoint and visuals
</commit_message>
<xml_diff>
--- a/ABMpresentationCompressed.pptx
+++ b/ABMpresentationCompressed.pptx
@@ -4442,7 +4442,7 @@
         </p:nvSpPr>
         <p:spPr>
           <a:xfrm>
-            <a:off x="10588752" y="1986915"/>
+            <a:off x="10506796" y="2124075"/>
             <a:ext cx="1424225" cy="2031325"/>
           </a:xfrm>
           <a:prstGeom prst="rect">
@@ -4471,10 +4471,10 @@
       </p:sp>
       <p:pic>
         <p:nvPicPr>
-          <p:cNvPr id="6" name="Picture 5" descr="Scatter chart&#10;&#10;Description automatically generated">
-            <a:extLst>
-              <a:ext uri="{FF2B5EF4-FFF2-40B4-BE49-F238E27FC236}">
-                <a16:creationId xmlns:a16="http://schemas.microsoft.com/office/drawing/2014/main" id="{D2E8A383-FB85-4DBC-A759-33D2D9178DC3}"/>
+          <p:cNvPr id="7" name="Picture 6" descr="Scatter chart&#10;&#10;Description automatically generated">
+            <a:extLst>
+              <a:ext uri="{FF2B5EF4-FFF2-40B4-BE49-F238E27FC236}">
+                <a16:creationId xmlns:a16="http://schemas.microsoft.com/office/drawing/2014/main" id="{D6B83070-22D5-4534-9D31-46CB6C131746}"/>
               </a:ext>
             </a:extLst>
           </p:cNvPr>
@@ -4491,8 +4491,8 @@
         </p:blipFill>
         <p:spPr>
           <a:xfrm>
-            <a:off x="763445" y="1986915"/>
-            <a:ext cx="4818888" cy="4818888"/>
+            <a:off x="839788" y="2087880"/>
+            <a:ext cx="4572000" cy="4572000"/>
           </a:xfrm>
           <a:prstGeom prst="rect">
             <a:avLst/>
@@ -4501,10 +4501,10 @@
       </p:pic>
       <p:pic>
         <p:nvPicPr>
-          <p:cNvPr id="9" name="Picture 8" descr="Scatter chart&#10;&#10;Description automatically generated">
-            <a:extLst>
-              <a:ext uri="{FF2B5EF4-FFF2-40B4-BE49-F238E27FC236}">
-                <a16:creationId xmlns:a16="http://schemas.microsoft.com/office/drawing/2014/main" id="{DE456F94-6D6E-49B2-AF39-C5326F46691E}"/>
+          <p:cNvPr id="10" name="Picture 9" descr="Scatter chart&#10;&#10;Description automatically generated">
+            <a:extLst>
+              <a:ext uri="{FF2B5EF4-FFF2-40B4-BE49-F238E27FC236}">
+                <a16:creationId xmlns:a16="http://schemas.microsoft.com/office/drawing/2014/main" id="{1164B1C8-01FC-4075-89FF-80D4020DBEE9}"/>
               </a:ext>
             </a:extLst>
           </p:cNvPr>
@@ -4521,8 +4521,8 @@
         </p:blipFill>
         <p:spPr>
           <a:xfrm>
-            <a:off x="5714270" y="1986915"/>
-            <a:ext cx="4818888" cy="4818888"/>
+            <a:off x="5684520" y="2087880"/>
+            <a:ext cx="4572000" cy="4572000"/>
           </a:xfrm>
           <a:prstGeom prst="rect">
             <a:avLst/>
@@ -4561,216 +4561,6 @@
       </p:grpSpPr>
       <p:sp>
         <p:nvSpPr>
-          <p:cNvPr id="6" name="Rectangle 5">
-            <a:extLst>
-              <a:ext uri="{FF2B5EF4-FFF2-40B4-BE49-F238E27FC236}">
-                <a16:creationId xmlns:a16="http://schemas.microsoft.com/office/drawing/2014/main" id="{B85669BB-CECE-404F-A85A-E57D9D2AD245}"/>
-              </a:ext>
-            </a:extLst>
-          </p:cNvPr>
-          <p:cNvSpPr/>
-          <p:nvPr/>
-        </p:nvSpPr>
-        <p:spPr>
-          <a:xfrm flipV="1">
-            <a:off x="6467475" y="0"/>
-            <a:ext cx="5724524" cy="6858000"/>
-          </a:xfrm>
-          <a:prstGeom prst="rect">
-            <a:avLst/>
-          </a:prstGeom>
-          <a:solidFill>
-            <a:schemeClr val="bg1">
-              <a:lumMod val="65000"/>
-            </a:schemeClr>
-          </a:solidFill>
-          <a:ln>
-            <a:noFill/>
-          </a:ln>
-        </p:spPr>
-        <p:style>
-          <a:lnRef idx="2">
-            <a:schemeClr val="accent1">
-              <a:shade val="50000"/>
-            </a:schemeClr>
-          </a:lnRef>
-          <a:fillRef idx="1">
-            <a:schemeClr val="accent1"/>
-          </a:fillRef>
-          <a:effectRef idx="0">
-            <a:schemeClr val="accent1"/>
-          </a:effectRef>
-          <a:fontRef idx="minor">
-            <a:schemeClr val="lt1"/>
-          </a:fontRef>
-        </p:style>
-        <p:txBody>
-          <a:bodyPr rtlCol="0" anchor="ctr"/>
-          <a:lstStyle/>
-          <a:p>
-            <a:pPr algn="ctr"/>
-            <a:endParaRPr lang="en-US" dirty="0"/>
-          </a:p>
-        </p:txBody>
-      </p:sp>
-      <p:sp>
-        <p:nvSpPr>
-          <p:cNvPr id="12" name="Rectangle 11">
-            <a:extLst>
-              <a:ext uri="{FF2B5EF4-FFF2-40B4-BE49-F238E27FC236}">
-                <a16:creationId xmlns:a16="http://schemas.microsoft.com/office/drawing/2014/main" id="{26E3BD03-0DB6-4376-B1AE-B0A61FE0F88E}"/>
-              </a:ext>
-            </a:extLst>
-          </p:cNvPr>
-          <p:cNvSpPr/>
-          <p:nvPr/>
-        </p:nvSpPr>
-        <p:spPr>
-          <a:xfrm>
-            <a:off x="6610746" y="45950"/>
-            <a:ext cx="5486400" cy="2200507"/>
-          </a:xfrm>
-          <a:prstGeom prst="rect">
-            <a:avLst/>
-          </a:prstGeom>
-          <a:solidFill>
-            <a:schemeClr val="bg1"/>
-          </a:solidFill>
-          <a:ln>
-            <a:noFill/>
-          </a:ln>
-        </p:spPr>
-        <p:style>
-          <a:lnRef idx="2">
-            <a:schemeClr val="accent1">
-              <a:shade val="50000"/>
-            </a:schemeClr>
-          </a:lnRef>
-          <a:fillRef idx="1">
-            <a:schemeClr val="accent1"/>
-          </a:fillRef>
-          <a:effectRef idx="0">
-            <a:schemeClr val="accent1"/>
-          </a:effectRef>
-          <a:fontRef idx="minor">
-            <a:schemeClr val="lt1"/>
-          </a:fontRef>
-        </p:style>
-        <p:txBody>
-          <a:bodyPr rtlCol="0" anchor="ctr"/>
-          <a:lstStyle/>
-          <a:p>
-            <a:pPr algn="ctr"/>
-            <a:endParaRPr lang="en-US"/>
-          </a:p>
-        </p:txBody>
-      </p:sp>
-      <p:sp>
-        <p:nvSpPr>
-          <p:cNvPr id="13" name="Rectangle 12">
-            <a:extLst>
-              <a:ext uri="{FF2B5EF4-FFF2-40B4-BE49-F238E27FC236}">
-                <a16:creationId xmlns:a16="http://schemas.microsoft.com/office/drawing/2014/main" id="{5CE2717F-A33C-4A26-BBEF-C2C93074ED3A}"/>
-              </a:ext>
-            </a:extLst>
-          </p:cNvPr>
-          <p:cNvSpPr/>
-          <p:nvPr/>
-        </p:nvSpPr>
-        <p:spPr>
-          <a:xfrm>
-            <a:off x="6605983" y="2320982"/>
-            <a:ext cx="5486400" cy="2200507"/>
-          </a:xfrm>
-          <a:prstGeom prst="rect">
-            <a:avLst/>
-          </a:prstGeom>
-          <a:solidFill>
-            <a:schemeClr val="bg1"/>
-          </a:solidFill>
-          <a:ln>
-            <a:noFill/>
-          </a:ln>
-        </p:spPr>
-        <p:style>
-          <a:lnRef idx="2">
-            <a:schemeClr val="accent1">
-              <a:shade val="50000"/>
-            </a:schemeClr>
-          </a:lnRef>
-          <a:fillRef idx="1">
-            <a:schemeClr val="accent1"/>
-          </a:fillRef>
-          <a:effectRef idx="0">
-            <a:schemeClr val="accent1"/>
-          </a:effectRef>
-          <a:fontRef idx="minor">
-            <a:schemeClr val="lt1"/>
-          </a:fontRef>
-        </p:style>
-        <p:txBody>
-          <a:bodyPr rtlCol="0" anchor="ctr"/>
-          <a:lstStyle/>
-          <a:p>
-            <a:pPr algn="ctr"/>
-            <a:endParaRPr lang="en-US"/>
-          </a:p>
-        </p:txBody>
-      </p:sp>
-      <p:sp>
-        <p:nvSpPr>
-          <p:cNvPr id="14" name="Rectangle 13">
-            <a:extLst>
-              <a:ext uri="{FF2B5EF4-FFF2-40B4-BE49-F238E27FC236}">
-                <a16:creationId xmlns:a16="http://schemas.microsoft.com/office/drawing/2014/main" id="{DB471614-2AAD-41BA-8D19-8A93D147516A}"/>
-              </a:ext>
-            </a:extLst>
-          </p:cNvPr>
-          <p:cNvSpPr/>
-          <p:nvPr/>
-        </p:nvSpPr>
-        <p:spPr>
-          <a:xfrm>
-            <a:off x="6596457" y="4608193"/>
-            <a:ext cx="5486400" cy="2200507"/>
-          </a:xfrm>
-          <a:prstGeom prst="rect">
-            <a:avLst/>
-          </a:prstGeom>
-          <a:solidFill>
-            <a:schemeClr val="bg1"/>
-          </a:solidFill>
-          <a:ln>
-            <a:noFill/>
-          </a:ln>
-        </p:spPr>
-        <p:style>
-          <a:lnRef idx="2">
-            <a:schemeClr val="accent1">
-              <a:shade val="50000"/>
-            </a:schemeClr>
-          </a:lnRef>
-          <a:fillRef idx="1">
-            <a:schemeClr val="accent1"/>
-          </a:fillRef>
-          <a:effectRef idx="0">
-            <a:schemeClr val="accent1"/>
-          </a:effectRef>
-          <a:fontRef idx="minor">
-            <a:schemeClr val="lt1"/>
-          </a:fontRef>
-        </p:style>
-        <p:txBody>
-          <a:bodyPr rtlCol="0" anchor="ctr"/>
-          <a:lstStyle/>
-          <a:p>
-            <a:pPr algn="ctr"/>
-            <a:endParaRPr lang="en-US"/>
-          </a:p>
-        </p:txBody>
-      </p:sp>
-      <p:sp>
-        <p:nvSpPr>
           <p:cNvPr id="2" name="Title 1">
             <a:extLst>
               <a:ext uri="{FF2B5EF4-FFF2-40B4-BE49-F238E27FC236}">
@@ -4955,192 +4745,570 @@
           </a:p>
         </p:txBody>
       </p:sp>
-      <p:pic>
-        <p:nvPicPr>
-          <p:cNvPr id="1036" name="Picture 12">
-            <a:extLst>
-              <a:ext uri="{FF2B5EF4-FFF2-40B4-BE49-F238E27FC236}">
-                <a16:creationId xmlns:a16="http://schemas.microsoft.com/office/drawing/2014/main" id="{C6D874F8-2C37-49E7-A4AE-F8D7286BA409}"/>
-              </a:ext>
-            </a:extLst>
-          </p:cNvPr>
-          <p:cNvPicPr>
-            <a:picLocks noChangeAspect="1" noChangeArrowheads="1"/>
-          </p:cNvPicPr>
+      <p:grpSp>
+        <p:nvGrpSpPr>
+          <p:cNvPr id="16" name="Group 15">
+            <a:extLst>
+              <a:ext uri="{FF2B5EF4-FFF2-40B4-BE49-F238E27FC236}">
+                <a16:creationId xmlns:a16="http://schemas.microsoft.com/office/drawing/2014/main" id="{31C3A973-DBAD-4298-91A5-60B23763B332}"/>
+              </a:ext>
+            </a:extLst>
+          </p:cNvPr>
+          <p:cNvGrpSpPr/>
           <p:nvPr/>
-        </p:nvPicPr>
-        <p:blipFill>
-          <a:blip r:embed="rId3" cstate="email">
-            <a:extLst>
-              <a:ext uri="{28A0092B-C50C-407E-A947-70E740481C1C}">
-                <a14:useLocalDpi xmlns:a14="http://schemas.microsoft.com/office/drawing/2010/main"/>
-              </a:ext>
-            </a:extLst>
-          </a:blip>
-          <a:srcRect/>
-          <a:stretch>
-            <a:fillRect/>
-          </a:stretch>
-        </p:blipFill>
-        <p:spPr bwMode="auto">
+        </p:nvGrpSpPr>
+        <p:grpSpPr>
           <a:xfrm>
-            <a:off x="6634559" y="4643555"/>
-            <a:ext cx="5486400" cy="2200507"/>
+            <a:off x="6467475" y="0"/>
+            <a:ext cx="5724524" cy="6858000"/>
+            <a:chOff x="6467475" y="0"/>
+            <a:chExt cx="5724524" cy="6858000"/>
           </a:xfrm>
-          <a:prstGeom prst="rect">
-            <a:avLst/>
-          </a:prstGeom>
-          <a:noFill/>
-          <a:extLst>
-            <a:ext uri="{909E8E84-426E-40DD-AFC4-6F175D3DCCD1}">
-              <a14:hiddenFill xmlns:a14="http://schemas.microsoft.com/office/drawing/2010/main">
-                <a:solidFill>
-                  <a:srgbClr val="FFFFFF"/>
-                </a:solidFill>
-              </a14:hiddenFill>
-            </a:ext>
-          </a:extLst>
-        </p:spPr>
-      </p:pic>
-      <p:pic>
-        <p:nvPicPr>
-          <p:cNvPr id="1038" name="Picture 14">
-            <a:extLst>
-              <a:ext uri="{FF2B5EF4-FFF2-40B4-BE49-F238E27FC236}">
-                <a16:creationId xmlns:a16="http://schemas.microsoft.com/office/drawing/2014/main" id="{506CACF4-35AF-43B2-8078-8EC906D1F4A4}"/>
-              </a:ext>
-            </a:extLst>
-          </p:cNvPr>
-          <p:cNvPicPr>
-            <a:picLocks noChangeAspect="1" noChangeArrowheads="1"/>
-          </p:cNvPicPr>
-          <p:nvPr/>
-        </p:nvPicPr>
-        <p:blipFill>
-          <a:blip r:embed="rId4" cstate="email">
-            <a:extLst>
-              <a:ext uri="{28A0092B-C50C-407E-A947-70E740481C1C}">
-                <a14:useLocalDpi xmlns:a14="http://schemas.microsoft.com/office/drawing/2010/main"/>
-              </a:ext>
-            </a:extLst>
-          </a:blip>
-          <a:srcRect/>
-          <a:stretch>
-            <a:fillRect/>
-          </a:stretch>
-        </p:blipFill>
-        <p:spPr bwMode="auto">
-          <a:xfrm>
-            <a:off x="6629796" y="2351232"/>
-            <a:ext cx="5486400" cy="2200507"/>
-          </a:xfrm>
-          <a:prstGeom prst="rect">
-            <a:avLst/>
-          </a:prstGeom>
-          <a:noFill/>
-          <a:extLst>
-            <a:ext uri="{909E8E84-426E-40DD-AFC4-6F175D3DCCD1}">
-              <a14:hiddenFill xmlns:a14="http://schemas.microsoft.com/office/drawing/2010/main">
-                <a:solidFill>
-                  <a:srgbClr val="FFFFFF"/>
-                </a:solidFill>
-              </a14:hiddenFill>
-            </a:ext>
-          </a:extLst>
-        </p:spPr>
-      </p:pic>
-      <p:pic>
-        <p:nvPicPr>
-          <p:cNvPr id="4098" name="Picture 2">
-            <a:extLst>
-              <a:ext uri="{FF2B5EF4-FFF2-40B4-BE49-F238E27FC236}">
-                <a16:creationId xmlns:a16="http://schemas.microsoft.com/office/drawing/2014/main" id="{226292F2-C0F8-4BDA-BA52-EF8BC6B7B176}"/>
-              </a:ext>
-            </a:extLst>
-          </p:cNvPr>
-          <p:cNvPicPr>
-            <a:picLocks noChangeAspect="1" noChangeArrowheads="1"/>
-          </p:cNvPicPr>
-          <p:nvPr/>
-        </p:nvPicPr>
-        <p:blipFill>
-          <a:blip r:embed="rId5" cstate="email">
-            <a:extLst>
-              <a:ext uri="{28A0092B-C50C-407E-A947-70E740481C1C}">
-                <a14:useLocalDpi xmlns:a14="http://schemas.microsoft.com/office/drawing/2010/main"/>
-              </a:ext>
-            </a:extLst>
-          </a:blip>
-          <a:srcRect/>
-          <a:stretch>
-            <a:fillRect/>
-          </a:stretch>
-        </p:blipFill>
-        <p:spPr bwMode="auto">
-          <a:xfrm>
-            <a:off x="6629796" y="28659"/>
-            <a:ext cx="5486400" cy="2200507"/>
-          </a:xfrm>
-          <a:prstGeom prst="rect">
-            <a:avLst/>
-          </a:prstGeom>
-          <a:noFill/>
-          <a:extLst>
-            <a:ext uri="{909E8E84-426E-40DD-AFC4-6F175D3DCCD1}">
-              <a14:hiddenFill xmlns:a14="http://schemas.microsoft.com/office/drawing/2010/main">
-                <a:solidFill>
-                  <a:srgbClr val="FFFFFF"/>
-                </a:solidFill>
-              </a14:hiddenFill>
-            </a:ext>
-          </a:extLst>
-        </p:spPr>
-      </p:pic>
-      <p:pic>
-        <p:nvPicPr>
-          <p:cNvPr id="4" name="Picture 8">
-            <a:extLst>
-              <a:ext uri="{FF2B5EF4-FFF2-40B4-BE49-F238E27FC236}">
-                <a16:creationId xmlns:a16="http://schemas.microsoft.com/office/drawing/2014/main" id="{78060810-BCC1-45E5-B2AC-3A7299641266}"/>
-              </a:ext>
-            </a:extLst>
-          </p:cNvPr>
-          <p:cNvPicPr>
-            <a:picLocks noChangeAspect="1" noChangeArrowheads="1"/>
-          </p:cNvPicPr>
-          <p:nvPr/>
-        </p:nvPicPr>
-        <p:blipFill rotWithShape="1">
-          <a:blip r:embed="rId6" cstate="email">
-            <a:extLst>
-              <a:ext uri="{28A0092B-C50C-407E-A947-70E740481C1C}">
-                <a14:useLocalDpi xmlns:a14="http://schemas.microsoft.com/office/drawing/2010/main"/>
-              </a:ext>
-            </a:extLst>
-          </a:blip>
-          <a:srcRect/>
-          <a:stretch/>
-        </p:blipFill>
-        <p:spPr bwMode="auto">
-          <a:xfrm>
-            <a:off x="10296275" y="4999103"/>
-            <a:ext cx="1484674" cy="1418686"/>
-          </a:xfrm>
-          <a:prstGeom prst="rect">
-            <a:avLst/>
-          </a:prstGeom>
-          <a:noFill/>
-          <a:extLst>
-            <a:ext uri="{909E8E84-426E-40DD-AFC4-6F175D3DCCD1}">
-              <a14:hiddenFill xmlns:a14="http://schemas.microsoft.com/office/drawing/2010/main">
-                <a:solidFill>
-                  <a:srgbClr val="FFFFFF"/>
-                </a:solidFill>
-              </a14:hiddenFill>
-            </a:ext>
-          </a:extLst>
-        </p:spPr>
-      </p:pic>
+        </p:grpSpPr>
+        <p:sp>
+          <p:nvSpPr>
+            <p:cNvPr id="6" name="Rectangle 5">
+              <a:extLst>
+                <a:ext uri="{FF2B5EF4-FFF2-40B4-BE49-F238E27FC236}">
+                  <a16:creationId xmlns:a16="http://schemas.microsoft.com/office/drawing/2014/main" id="{B85669BB-CECE-404F-A85A-E57D9D2AD245}"/>
+                </a:ext>
+              </a:extLst>
+            </p:cNvPr>
+            <p:cNvSpPr/>
+            <p:nvPr/>
+          </p:nvSpPr>
+          <p:spPr>
+            <a:xfrm flipV="1">
+              <a:off x="6467475" y="0"/>
+              <a:ext cx="5724524" cy="6858000"/>
+            </a:xfrm>
+            <a:prstGeom prst="rect">
+              <a:avLst/>
+            </a:prstGeom>
+            <a:solidFill>
+              <a:schemeClr val="bg1">
+                <a:lumMod val="65000"/>
+              </a:schemeClr>
+            </a:solidFill>
+            <a:ln>
+              <a:noFill/>
+            </a:ln>
+          </p:spPr>
+          <p:style>
+            <a:lnRef idx="2">
+              <a:schemeClr val="accent1">
+                <a:shade val="50000"/>
+              </a:schemeClr>
+            </a:lnRef>
+            <a:fillRef idx="1">
+              <a:schemeClr val="accent1"/>
+            </a:fillRef>
+            <a:effectRef idx="0">
+              <a:schemeClr val="accent1"/>
+            </a:effectRef>
+            <a:fontRef idx="minor">
+              <a:schemeClr val="lt1"/>
+            </a:fontRef>
+          </p:style>
+          <p:txBody>
+            <a:bodyPr rtlCol="0" anchor="ctr"/>
+            <a:lstStyle/>
+            <a:p>
+              <a:pPr algn="ctr"/>
+              <a:endParaRPr lang="en-US" dirty="0"/>
+            </a:p>
+          </p:txBody>
+        </p:sp>
+        <p:sp>
+          <p:nvSpPr>
+            <p:cNvPr id="12" name="Rectangle 11">
+              <a:extLst>
+                <a:ext uri="{FF2B5EF4-FFF2-40B4-BE49-F238E27FC236}">
+                  <a16:creationId xmlns:a16="http://schemas.microsoft.com/office/drawing/2014/main" id="{26E3BD03-0DB6-4376-B1AE-B0A61FE0F88E}"/>
+                </a:ext>
+              </a:extLst>
+            </p:cNvPr>
+            <p:cNvSpPr/>
+            <p:nvPr/>
+          </p:nvSpPr>
+          <p:spPr>
+            <a:xfrm>
+              <a:off x="6610746" y="45950"/>
+              <a:ext cx="5486400" cy="2200507"/>
+            </a:xfrm>
+            <a:prstGeom prst="rect">
+              <a:avLst/>
+            </a:prstGeom>
+            <a:solidFill>
+              <a:schemeClr val="bg1"/>
+            </a:solidFill>
+            <a:ln>
+              <a:noFill/>
+            </a:ln>
+          </p:spPr>
+          <p:style>
+            <a:lnRef idx="2">
+              <a:schemeClr val="accent1">
+                <a:shade val="50000"/>
+              </a:schemeClr>
+            </a:lnRef>
+            <a:fillRef idx="1">
+              <a:schemeClr val="accent1"/>
+            </a:fillRef>
+            <a:effectRef idx="0">
+              <a:schemeClr val="accent1"/>
+            </a:effectRef>
+            <a:fontRef idx="minor">
+              <a:schemeClr val="lt1"/>
+            </a:fontRef>
+          </p:style>
+          <p:txBody>
+            <a:bodyPr rtlCol="0" anchor="ctr"/>
+            <a:lstStyle/>
+            <a:p>
+              <a:pPr algn="ctr"/>
+              <a:endParaRPr lang="en-US"/>
+            </a:p>
+          </p:txBody>
+        </p:sp>
+        <p:sp>
+          <p:nvSpPr>
+            <p:cNvPr id="13" name="Rectangle 12">
+              <a:extLst>
+                <a:ext uri="{FF2B5EF4-FFF2-40B4-BE49-F238E27FC236}">
+                  <a16:creationId xmlns:a16="http://schemas.microsoft.com/office/drawing/2014/main" id="{5CE2717F-A33C-4A26-BBEF-C2C93074ED3A}"/>
+                </a:ext>
+              </a:extLst>
+            </p:cNvPr>
+            <p:cNvSpPr/>
+            <p:nvPr/>
+          </p:nvSpPr>
+          <p:spPr>
+            <a:xfrm>
+              <a:off x="6605983" y="2320982"/>
+              <a:ext cx="5486400" cy="2200507"/>
+            </a:xfrm>
+            <a:prstGeom prst="rect">
+              <a:avLst/>
+            </a:prstGeom>
+            <a:solidFill>
+              <a:schemeClr val="bg1"/>
+            </a:solidFill>
+            <a:ln>
+              <a:noFill/>
+            </a:ln>
+          </p:spPr>
+          <p:style>
+            <a:lnRef idx="2">
+              <a:schemeClr val="accent1">
+                <a:shade val="50000"/>
+              </a:schemeClr>
+            </a:lnRef>
+            <a:fillRef idx="1">
+              <a:schemeClr val="accent1"/>
+            </a:fillRef>
+            <a:effectRef idx="0">
+              <a:schemeClr val="accent1"/>
+            </a:effectRef>
+            <a:fontRef idx="minor">
+              <a:schemeClr val="lt1"/>
+            </a:fontRef>
+          </p:style>
+          <p:txBody>
+            <a:bodyPr rtlCol="0" anchor="ctr"/>
+            <a:lstStyle/>
+            <a:p>
+              <a:pPr algn="ctr"/>
+              <a:endParaRPr lang="en-US"/>
+            </a:p>
+          </p:txBody>
+        </p:sp>
+        <p:sp>
+          <p:nvSpPr>
+            <p:cNvPr id="14" name="Rectangle 13">
+              <a:extLst>
+                <a:ext uri="{FF2B5EF4-FFF2-40B4-BE49-F238E27FC236}">
+                  <a16:creationId xmlns:a16="http://schemas.microsoft.com/office/drawing/2014/main" id="{DB471614-2AAD-41BA-8D19-8A93D147516A}"/>
+                </a:ext>
+              </a:extLst>
+            </p:cNvPr>
+            <p:cNvSpPr/>
+            <p:nvPr/>
+          </p:nvSpPr>
+          <p:spPr>
+            <a:xfrm>
+              <a:off x="6596457" y="4608193"/>
+              <a:ext cx="5486400" cy="2200507"/>
+            </a:xfrm>
+            <a:prstGeom prst="rect">
+              <a:avLst/>
+            </a:prstGeom>
+            <a:solidFill>
+              <a:schemeClr val="bg1"/>
+            </a:solidFill>
+            <a:ln>
+              <a:noFill/>
+            </a:ln>
+          </p:spPr>
+          <p:style>
+            <a:lnRef idx="2">
+              <a:schemeClr val="accent1">
+                <a:shade val="50000"/>
+              </a:schemeClr>
+            </a:lnRef>
+            <a:fillRef idx="1">
+              <a:schemeClr val="accent1"/>
+            </a:fillRef>
+            <a:effectRef idx="0">
+              <a:schemeClr val="accent1"/>
+            </a:effectRef>
+            <a:fontRef idx="minor">
+              <a:schemeClr val="lt1"/>
+            </a:fontRef>
+          </p:style>
+          <p:txBody>
+            <a:bodyPr rtlCol="0" anchor="ctr"/>
+            <a:lstStyle/>
+            <a:p>
+              <a:pPr algn="ctr"/>
+              <a:endParaRPr lang="en-US"/>
+            </a:p>
+          </p:txBody>
+        </p:sp>
+        <p:grpSp>
+          <p:nvGrpSpPr>
+            <p:cNvPr id="11" name="Group 10">
+              <a:extLst>
+                <a:ext uri="{FF2B5EF4-FFF2-40B4-BE49-F238E27FC236}">
+                  <a16:creationId xmlns:a16="http://schemas.microsoft.com/office/drawing/2014/main" id="{203301B4-1B50-4C48-8FFE-074A64D5A5C3}"/>
+                </a:ext>
+              </a:extLst>
+            </p:cNvPr>
+            <p:cNvGrpSpPr/>
+            <p:nvPr/>
+          </p:nvGrpSpPr>
+          <p:grpSpPr>
+            <a:xfrm>
+              <a:off x="6629796" y="28659"/>
+              <a:ext cx="5491163" cy="6815403"/>
+              <a:chOff x="6629796" y="28659"/>
+              <a:chExt cx="5491163" cy="6815403"/>
+            </a:xfrm>
+          </p:grpSpPr>
+          <p:grpSp>
+            <p:nvGrpSpPr>
+              <p:cNvPr id="5" name="Group 4">
+                <a:extLst>
+                  <a:ext uri="{FF2B5EF4-FFF2-40B4-BE49-F238E27FC236}">
+                    <a16:creationId xmlns:a16="http://schemas.microsoft.com/office/drawing/2014/main" id="{93582E38-BFFD-4569-A05A-1506B56E2A6A}"/>
+                  </a:ext>
+                </a:extLst>
+              </p:cNvPr>
+              <p:cNvGrpSpPr/>
+              <p:nvPr/>
+            </p:nvGrpSpPr>
+            <p:grpSpPr>
+              <a:xfrm>
+                <a:off x="6629796" y="28659"/>
+                <a:ext cx="5491163" cy="6815403"/>
+                <a:chOff x="6629796" y="28659"/>
+                <a:chExt cx="5491163" cy="6815403"/>
+              </a:xfrm>
+            </p:grpSpPr>
+            <p:pic>
+              <p:nvPicPr>
+                <p:cNvPr id="1036" name="Picture 12">
+                  <a:extLst>
+                    <a:ext uri="{FF2B5EF4-FFF2-40B4-BE49-F238E27FC236}">
+                      <a16:creationId xmlns:a16="http://schemas.microsoft.com/office/drawing/2014/main" id="{C6D874F8-2C37-49E7-A4AE-F8D7286BA409}"/>
+                    </a:ext>
+                  </a:extLst>
+                </p:cNvPr>
+                <p:cNvPicPr>
+                  <a:picLocks noChangeAspect="1" noChangeArrowheads="1"/>
+                </p:cNvPicPr>
+                <p:nvPr/>
+              </p:nvPicPr>
+              <p:blipFill>
+                <a:blip r:embed="rId3" cstate="email">
+                  <a:extLst>
+                    <a:ext uri="{28A0092B-C50C-407E-A947-70E740481C1C}">
+                      <a14:useLocalDpi xmlns:a14="http://schemas.microsoft.com/office/drawing/2010/main"/>
+                    </a:ext>
+                  </a:extLst>
+                </a:blip>
+                <a:srcRect/>
+                <a:stretch>
+                  <a:fillRect/>
+                </a:stretch>
+              </p:blipFill>
+              <p:spPr bwMode="auto">
+                <a:xfrm>
+                  <a:off x="6634559" y="4643555"/>
+                  <a:ext cx="5486400" cy="2200507"/>
+                </a:xfrm>
+                <a:prstGeom prst="rect">
+                  <a:avLst/>
+                </a:prstGeom>
+                <a:noFill/>
+                <a:extLst>
+                  <a:ext uri="{909E8E84-426E-40DD-AFC4-6F175D3DCCD1}">
+                    <a14:hiddenFill xmlns:a14="http://schemas.microsoft.com/office/drawing/2010/main">
+                      <a:solidFill>
+                        <a:srgbClr val="FFFFFF"/>
+                      </a:solidFill>
+                    </a14:hiddenFill>
+                  </a:ext>
+                </a:extLst>
+              </p:spPr>
+            </p:pic>
+            <p:pic>
+              <p:nvPicPr>
+                <p:cNvPr id="1038" name="Picture 14">
+                  <a:extLst>
+                    <a:ext uri="{FF2B5EF4-FFF2-40B4-BE49-F238E27FC236}">
+                      <a16:creationId xmlns:a16="http://schemas.microsoft.com/office/drawing/2014/main" id="{506CACF4-35AF-43B2-8078-8EC906D1F4A4}"/>
+                    </a:ext>
+                  </a:extLst>
+                </p:cNvPr>
+                <p:cNvPicPr>
+                  <a:picLocks noChangeAspect="1" noChangeArrowheads="1"/>
+                </p:cNvPicPr>
+                <p:nvPr/>
+              </p:nvPicPr>
+              <p:blipFill>
+                <a:blip r:embed="rId4" cstate="email">
+                  <a:extLst>
+                    <a:ext uri="{28A0092B-C50C-407E-A947-70E740481C1C}">
+                      <a14:useLocalDpi xmlns:a14="http://schemas.microsoft.com/office/drawing/2010/main"/>
+                    </a:ext>
+                  </a:extLst>
+                </a:blip>
+                <a:srcRect/>
+                <a:stretch>
+                  <a:fillRect/>
+                </a:stretch>
+              </p:blipFill>
+              <p:spPr bwMode="auto">
+                <a:xfrm>
+                  <a:off x="6629796" y="2351232"/>
+                  <a:ext cx="5486400" cy="2200507"/>
+                </a:xfrm>
+                <a:prstGeom prst="rect">
+                  <a:avLst/>
+                </a:prstGeom>
+                <a:noFill/>
+                <a:extLst>
+                  <a:ext uri="{909E8E84-426E-40DD-AFC4-6F175D3DCCD1}">
+                    <a14:hiddenFill xmlns:a14="http://schemas.microsoft.com/office/drawing/2010/main">
+                      <a:solidFill>
+                        <a:srgbClr val="FFFFFF"/>
+                      </a:solidFill>
+                    </a14:hiddenFill>
+                  </a:ext>
+                </a:extLst>
+              </p:spPr>
+            </p:pic>
+            <p:pic>
+              <p:nvPicPr>
+                <p:cNvPr id="4098" name="Picture 2">
+                  <a:extLst>
+                    <a:ext uri="{FF2B5EF4-FFF2-40B4-BE49-F238E27FC236}">
+                      <a16:creationId xmlns:a16="http://schemas.microsoft.com/office/drawing/2014/main" id="{226292F2-C0F8-4BDA-BA52-EF8BC6B7B176}"/>
+                    </a:ext>
+                  </a:extLst>
+                </p:cNvPr>
+                <p:cNvPicPr>
+                  <a:picLocks noChangeAspect="1" noChangeArrowheads="1"/>
+                </p:cNvPicPr>
+                <p:nvPr/>
+              </p:nvPicPr>
+              <p:blipFill>
+                <a:blip r:embed="rId5" cstate="email">
+                  <a:extLst>
+                    <a:ext uri="{28A0092B-C50C-407E-A947-70E740481C1C}">
+                      <a14:useLocalDpi xmlns:a14="http://schemas.microsoft.com/office/drawing/2010/main"/>
+                    </a:ext>
+                  </a:extLst>
+                </a:blip>
+                <a:srcRect/>
+                <a:stretch>
+                  <a:fillRect/>
+                </a:stretch>
+              </p:blipFill>
+              <p:spPr bwMode="auto">
+                <a:xfrm>
+                  <a:off x="6629796" y="28659"/>
+                  <a:ext cx="5486400" cy="2200507"/>
+                </a:xfrm>
+                <a:prstGeom prst="rect">
+                  <a:avLst/>
+                </a:prstGeom>
+                <a:noFill/>
+                <a:extLst>
+                  <a:ext uri="{909E8E84-426E-40DD-AFC4-6F175D3DCCD1}">
+                    <a14:hiddenFill xmlns:a14="http://schemas.microsoft.com/office/drawing/2010/main">
+                      <a:solidFill>
+                        <a:srgbClr val="FFFFFF"/>
+                      </a:solidFill>
+                    </a14:hiddenFill>
+                  </a:ext>
+                </a:extLst>
+              </p:spPr>
+            </p:pic>
+            <p:pic>
+              <p:nvPicPr>
+                <p:cNvPr id="4" name="Picture 8">
+                  <a:extLst>
+                    <a:ext uri="{FF2B5EF4-FFF2-40B4-BE49-F238E27FC236}">
+                      <a16:creationId xmlns:a16="http://schemas.microsoft.com/office/drawing/2014/main" id="{78060810-BCC1-45E5-B2AC-3A7299641266}"/>
+                    </a:ext>
+                  </a:extLst>
+                </p:cNvPr>
+                <p:cNvPicPr>
+                  <a:picLocks noChangeAspect="1" noChangeArrowheads="1"/>
+                </p:cNvPicPr>
+                <p:nvPr/>
+              </p:nvPicPr>
+              <p:blipFill rotWithShape="1">
+                <a:blip r:embed="rId6" cstate="email">
+                  <a:extLst>
+                    <a:ext uri="{28A0092B-C50C-407E-A947-70E740481C1C}">
+                      <a14:useLocalDpi xmlns:a14="http://schemas.microsoft.com/office/drawing/2010/main"/>
+                    </a:ext>
+                  </a:extLst>
+                </a:blip>
+                <a:srcRect/>
+                <a:stretch/>
+              </p:blipFill>
+              <p:spPr bwMode="auto">
+                <a:xfrm>
+                  <a:off x="10296275" y="4999103"/>
+                  <a:ext cx="1484674" cy="1418686"/>
+                </a:xfrm>
+                <a:prstGeom prst="rect">
+                  <a:avLst/>
+                </a:prstGeom>
+                <a:noFill/>
+                <a:extLst>
+                  <a:ext uri="{909E8E84-426E-40DD-AFC4-6F175D3DCCD1}">
+                    <a14:hiddenFill xmlns:a14="http://schemas.microsoft.com/office/drawing/2010/main">
+                      <a:solidFill>
+                        <a:srgbClr val="FFFFFF"/>
+                      </a:solidFill>
+                    </a14:hiddenFill>
+                  </a:ext>
+                </a:extLst>
+              </p:spPr>
+            </p:pic>
+          </p:grpSp>
+          <p:sp>
+            <p:nvSpPr>
+              <p:cNvPr id="8" name="TextBox 7">
+                <a:extLst>
+                  <a:ext uri="{FF2B5EF4-FFF2-40B4-BE49-F238E27FC236}">
+                    <a16:creationId xmlns:a16="http://schemas.microsoft.com/office/drawing/2014/main" id="{60B79341-DEAA-4CFA-98C7-4F279ABC920A}"/>
+                  </a:ext>
+                </a:extLst>
+              </p:cNvPr>
+              <p:cNvSpPr txBox="1"/>
+              <p:nvPr/>
+            </p:nvSpPr>
+            <p:spPr>
+              <a:xfrm>
+                <a:off x="7225664" y="272043"/>
+                <a:ext cx="675185" cy="430887"/>
+              </a:xfrm>
+              <a:prstGeom prst="rect">
+                <a:avLst/>
+              </a:prstGeom>
+              <a:noFill/>
+            </p:spPr>
+            <p:txBody>
+              <a:bodyPr wrap="none" rtlCol="0">
+                <a:spAutoFit/>
+              </a:bodyPr>
+              <a:lstStyle/>
+              <a:p>
+                <a:r>
+                  <a:rPr lang="en-US" sz="2200" b="1" dirty="0"/>
+                  <a:t>30%</a:t>
+                </a:r>
+              </a:p>
+            </p:txBody>
+          </p:sp>
+          <p:sp>
+            <p:nvSpPr>
+              <p:cNvPr id="9" name="TextBox 8">
+                <a:extLst>
+                  <a:ext uri="{FF2B5EF4-FFF2-40B4-BE49-F238E27FC236}">
+                    <a16:creationId xmlns:a16="http://schemas.microsoft.com/office/drawing/2014/main" id="{2A0B901D-2A61-4F58-A211-D86A28F1D97A}"/>
+                  </a:ext>
+                </a:extLst>
+              </p:cNvPr>
+              <p:cNvSpPr txBox="1"/>
+              <p:nvPr/>
+            </p:nvSpPr>
+            <p:spPr>
+              <a:xfrm>
+                <a:off x="7247433" y="2561396"/>
+                <a:ext cx="675185" cy="430887"/>
+              </a:xfrm>
+              <a:prstGeom prst="rect">
+                <a:avLst/>
+              </a:prstGeom>
+              <a:noFill/>
+            </p:spPr>
+            <p:txBody>
+              <a:bodyPr wrap="none" rtlCol="0">
+                <a:spAutoFit/>
+              </a:bodyPr>
+              <a:lstStyle/>
+              <a:p>
+                <a:r>
+                  <a:rPr lang="en-US" sz="2200" b="1" dirty="0"/>
+                  <a:t>60%</a:t>
+                </a:r>
+              </a:p>
+            </p:txBody>
+          </p:sp>
+          <p:sp>
+            <p:nvSpPr>
+              <p:cNvPr id="10" name="TextBox 9">
+                <a:extLst>
+                  <a:ext uri="{FF2B5EF4-FFF2-40B4-BE49-F238E27FC236}">
+                    <a16:creationId xmlns:a16="http://schemas.microsoft.com/office/drawing/2014/main" id="{11547A56-DE72-4D21-A2F5-EA23E16B32E7}"/>
+                  </a:ext>
+                </a:extLst>
+              </p:cNvPr>
+              <p:cNvSpPr txBox="1"/>
+              <p:nvPr/>
+            </p:nvSpPr>
+            <p:spPr>
+              <a:xfrm>
+                <a:off x="7225663" y="4855204"/>
+                <a:ext cx="675185" cy="430887"/>
+              </a:xfrm>
+              <a:prstGeom prst="rect">
+                <a:avLst/>
+              </a:prstGeom>
+              <a:noFill/>
+            </p:spPr>
+            <p:txBody>
+              <a:bodyPr wrap="none" rtlCol="0">
+                <a:spAutoFit/>
+              </a:bodyPr>
+              <a:lstStyle/>
+              <a:p>
+                <a:r>
+                  <a:rPr lang="en-US" sz="2200" b="1" dirty="0"/>
+                  <a:t>90%</a:t>
+                </a:r>
+              </a:p>
+            </p:txBody>
+          </p:sp>
+        </p:grpSp>
+      </p:grpSp>
     </p:spTree>
     <p:extLst>
       <p:ext uri="{BB962C8B-B14F-4D97-AF65-F5344CB8AC3E}">
@@ -5725,8 +5893,8 @@
         </p:blipFill>
         <p:spPr>
           <a:xfrm>
-            <a:off x="461772" y="1773555"/>
-            <a:ext cx="4818888" cy="4818888"/>
+            <a:off x="608775" y="1773555"/>
+            <a:ext cx="4572000" cy="4572000"/>
           </a:xfrm>
         </p:spPr>
       </p:pic>
@@ -5752,8 +5920,8 @@
         </p:blipFill>
         <p:spPr>
           <a:xfrm>
-            <a:off x="5525262" y="1773555"/>
-            <a:ext cx="4818888" cy="4818888"/>
+            <a:off x="5672265" y="1773555"/>
+            <a:ext cx="4572000" cy="4572000"/>
           </a:xfrm>
           <a:prstGeom prst="rect">
             <a:avLst/>
@@ -6010,402 +6178,528 @@
           </a:p>
         </p:txBody>
       </p:sp>
-      <p:sp>
-        <p:nvSpPr>
-          <p:cNvPr id="13" name="Rectangle 12">
-            <a:extLst>
-              <a:ext uri="{FF2B5EF4-FFF2-40B4-BE49-F238E27FC236}">
-                <a16:creationId xmlns:a16="http://schemas.microsoft.com/office/drawing/2014/main" id="{F9FC75BC-BE11-40F3-88B7-3916540276E5}"/>
-              </a:ext>
-            </a:extLst>
-          </p:cNvPr>
-          <p:cNvSpPr/>
+      <p:grpSp>
+        <p:nvGrpSpPr>
+          <p:cNvPr id="10" name="Group 9">
+            <a:extLst>
+              <a:ext uri="{FF2B5EF4-FFF2-40B4-BE49-F238E27FC236}">
+                <a16:creationId xmlns:a16="http://schemas.microsoft.com/office/drawing/2014/main" id="{E80D0B9C-86EA-40E9-ADAD-B0B4248698C7}"/>
+              </a:ext>
+            </a:extLst>
+          </p:cNvPr>
+          <p:cNvGrpSpPr/>
           <p:nvPr/>
-        </p:nvSpPr>
-        <p:spPr>
-          <a:xfrm flipV="1">
+        </p:nvGrpSpPr>
+        <p:grpSpPr>
+          <a:xfrm>
             <a:off x="6467475" y="0"/>
             <a:ext cx="5724524" cy="6858000"/>
+            <a:chOff x="6467475" y="0"/>
+            <a:chExt cx="5724524" cy="6858000"/>
           </a:xfrm>
-          <a:prstGeom prst="rect">
-            <a:avLst/>
-          </a:prstGeom>
-          <a:solidFill>
-            <a:schemeClr val="bg1">
-              <a:lumMod val="65000"/>
-            </a:schemeClr>
-          </a:solidFill>
-          <a:ln>
+        </p:grpSpPr>
+        <p:sp>
+          <p:nvSpPr>
+            <p:cNvPr id="13" name="Rectangle 12">
+              <a:extLst>
+                <a:ext uri="{FF2B5EF4-FFF2-40B4-BE49-F238E27FC236}">
+                  <a16:creationId xmlns:a16="http://schemas.microsoft.com/office/drawing/2014/main" id="{F9FC75BC-BE11-40F3-88B7-3916540276E5}"/>
+                </a:ext>
+              </a:extLst>
+            </p:cNvPr>
+            <p:cNvSpPr/>
+            <p:nvPr/>
+          </p:nvSpPr>
+          <p:spPr>
+            <a:xfrm flipV="1">
+              <a:off x="6467475" y="0"/>
+              <a:ext cx="5724524" cy="6858000"/>
+            </a:xfrm>
+            <a:prstGeom prst="rect">
+              <a:avLst/>
+            </a:prstGeom>
+            <a:solidFill>
+              <a:schemeClr val="bg1">
+                <a:lumMod val="65000"/>
+              </a:schemeClr>
+            </a:solidFill>
+            <a:ln>
+              <a:noFill/>
+            </a:ln>
+          </p:spPr>
+          <p:style>
+            <a:lnRef idx="2">
+              <a:schemeClr val="accent1">
+                <a:shade val="50000"/>
+              </a:schemeClr>
+            </a:lnRef>
+            <a:fillRef idx="1">
+              <a:schemeClr val="accent1"/>
+            </a:fillRef>
+            <a:effectRef idx="0">
+              <a:schemeClr val="accent1"/>
+            </a:effectRef>
+            <a:fontRef idx="minor">
+              <a:schemeClr val="lt1"/>
+            </a:fontRef>
+          </p:style>
+          <p:txBody>
+            <a:bodyPr rtlCol="0" anchor="ctr"/>
+            <a:lstStyle/>
+            <a:p>
+              <a:pPr algn="ctr"/>
+              <a:endParaRPr lang="en-US" dirty="0"/>
+            </a:p>
+          </p:txBody>
+        </p:sp>
+        <p:sp>
+          <p:nvSpPr>
+            <p:cNvPr id="15" name="Rectangle 14">
+              <a:extLst>
+                <a:ext uri="{FF2B5EF4-FFF2-40B4-BE49-F238E27FC236}">
+                  <a16:creationId xmlns:a16="http://schemas.microsoft.com/office/drawing/2014/main" id="{F6CD3855-57F8-4029-A84B-BCCAEDFA9C9B}"/>
+                </a:ext>
+              </a:extLst>
+            </p:cNvPr>
+            <p:cNvSpPr/>
+            <p:nvPr/>
+          </p:nvSpPr>
+          <p:spPr>
+            <a:xfrm>
+              <a:off x="6610746" y="45950"/>
+              <a:ext cx="5486400" cy="2200507"/>
+            </a:xfrm>
+            <a:prstGeom prst="rect">
+              <a:avLst/>
+            </a:prstGeom>
+            <a:solidFill>
+              <a:schemeClr val="bg1"/>
+            </a:solidFill>
+            <a:ln>
+              <a:noFill/>
+            </a:ln>
+          </p:spPr>
+          <p:style>
+            <a:lnRef idx="2">
+              <a:schemeClr val="accent1">
+                <a:shade val="50000"/>
+              </a:schemeClr>
+            </a:lnRef>
+            <a:fillRef idx="1">
+              <a:schemeClr val="accent1"/>
+            </a:fillRef>
+            <a:effectRef idx="0">
+              <a:schemeClr val="accent1"/>
+            </a:effectRef>
+            <a:fontRef idx="minor">
+              <a:schemeClr val="lt1"/>
+            </a:fontRef>
+          </p:style>
+          <p:txBody>
+            <a:bodyPr rtlCol="0" anchor="ctr"/>
+            <a:lstStyle/>
+            <a:p>
+              <a:pPr algn="ctr"/>
+              <a:endParaRPr lang="en-US"/>
+            </a:p>
+          </p:txBody>
+        </p:sp>
+        <p:sp>
+          <p:nvSpPr>
+            <p:cNvPr id="17" name="Rectangle 16">
+              <a:extLst>
+                <a:ext uri="{FF2B5EF4-FFF2-40B4-BE49-F238E27FC236}">
+                  <a16:creationId xmlns:a16="http://schemas.microsoft.com/office/drawing/2014/main" id="{A55BBC58-5239-41B9-B3BE-6A58CE147948}"/>
+                </a:ext>
+              </a:extLst>
+            </p:cNvPr>
+            <p:cNvSpPr/>
+            <p:nvPr/>
+          </p:nvSpPr>
+          <p:spPr>
+            <a:xfrm>
+              <a:off x="6605983" y="2320982"/>
+              <a:ext cx="5486400" cy="2200507"/>
+            </a:xfrm>
+            <a:prstGeom prst="rect">
+              <a:avLst/>
+            </a:prstGeom>
+            <a:solidFill>
+              <a:schemeClr val="bg1"/>
+            </a:solidFill>
+            <a:ln>
+              <a:noFill/>
+            </a:ln>
+          </p:spPr>
+          <p:style>
+            <a:lnRef idx="2">
+              <a:schemeClr val="accent1">
+                <a:shade val="50000"/>
+              </a:schemeClr>
+            </a:lnRef>
+            <a:fillRef idx="1">
+              <a:schemeClr val="accent1"/>
+            </a:fillRef>
+            <a:effectRef idx="0">
+              <a:schemeClr val="accent1"/>
+            </a:effectRef>
+            <a:fontRef idx="minor">
+              <a:schemeClr val="lt1"/>
+            </a:fontRef>
+          </p:style>
+          <p:txBody>
+            <a:bodyPr rtlCol="0" anchor="ctr"/>
+            <a:lstStyle/>
+            <a:p>
+              <a:pPr algn="ctr"/>
+              <a:endParaRPr lang="en-US"/>
+            </a:p>
+          </p:txBody>
+        </p:sp>
+        <p:sp>
+          <p:nvSpPr>
+            <p:cNvPr id="19" name="Rectangle 18">
+              <a:extLst>
+                <a:ext uri="{FF2B5EF4-FFF2-40B4-BE49-F238E27FC236}">
+                  <a16:creationId xmlns:a16="http://schemas.microsoft.com/office/drawing/2014/main" id="{28F97D12-DA68-4C2D-A558-71450CA2722D}"/>
+                </a:ext>
+              </a:extLst>
+            </p:cNvPr>
+            <p:cNvSpPr/>
+            <p:nvPr/>
+          </p:nvSpPr>
+          <p:spPr>
+            <a:xfrm>
+              <a:off x="6596457" y="4608193"/>
+              <a:ext cx="5486400" cy="2200507"/>
+            </a:xfrm>
+            <a:prstGeom prst="rect">
+              <a:avLst/>
+            </a:prstGeom>
+            <a:solidFill>
+              <a:schemeClr val="bg1"/>
+            </a:solidFill>
+            <a:ln>
+              <a:noFill/>
+            </a:ln>
+          </p:spPr>
+          <p:style>
+            <a:lnRef idx="2">
+              <a:schemeClr val="accent1">
+                <a:shade val="50000"/>
+              </a:schemeClr>
+            </a:lnRef>
+            <a:fillRef idx="1">
+              <a:schemeClr val="accent1"/>
+            </a:fillRef>
+            <a:effectRef idx="0">
+              <a:schemeClr val="accent1"/>
+            </a:effectRef>
+            <a:fontRef idx="minor">
+              <a:schemeClr val="lt1"/>
+            </a:fontRef>
+          </p:style>
+          <p:txBody>
+            <a:bodyPr rtlCol="0" anchor="ctr"/>
+            <a:lstStyle/>
+            <a:p>
+              <a:pPr algn="ctr"/>
+              <a:endParaRPr lang="en-US"/>
+            </a:p>
+          </p:txBody>
+        </p:sp>
+        <p:pic>
+          <p:nvPicPr>
+            <p:cNvPr id="1026" name="Picture 2">
+              <a:extLst>
+                <a:ext uri="{FF2B5EF4-FFF2-40B4-BE49-F238E27FC236}">
+                  <a16:creationId xmlns:a16="http://schemas.microsoft.com/office/drawing/2014/main" id="{EEE78AC3-9ABC-478E-985A-EF0E83A8DBAE}"/>
+                </a:ext>
+              </a:extLst>
+            </p:cNvPr>
+            <p:cNvPicPr>
+              <a:picLocks noChangeAspect="1" noChangeArrowheads="1"/>
+            </p:cNvPicPr>
+            <p:nvPr/>
+          </p:nvPicPr>
+          <p:blipFill>
+            <a:blip r:embed="rId3" cstate="email">
+              <a:extLst>
+                <a:ext uri="{28A0092B-C50C-407E-A947-70E740481C1C}">
+                  <a14:useLocalDpi xmlns:a14="http://schemas.microsoft.com/office/drawing/2010/main"/>
+                </a:ext>
+              </a:extLst>
+            </a:blip>
+            <a:srcRect/>
+            <a:stretch>
+              <a:fillRect/>
+            </a:stretch>
+          </p:blipFill>
+          <p:spPr bwMode="auto">
+            <a:xfrm>
+              <a:off x="6620548" y="4623663"/>
+              <a:ext cx="5486400" cy="2200507"/>
+            </a:xfrm>
+            <a:prstGeom prst="rect">
+              <a:avLst/>
+            </a:prstGeom>
             <a:noFill/>
-          </a:ln>
-        </p:spPr>
-        <p:style>
-          <a:lnRef idx="2">
-            <a:schemeClr val="accent1">
-              <a:shade val="50000"/>
-            </a:schemeClr>
-          </a:lnRef>
-          <a:fillRef idx="1">
-            <a:schemeClr val="accent1"/>
-          </a:fillRef>
-          <a:effectRef idx="0">
-            <a:schemeClr val="accent1"/>
-          </a:effectRef>
-          <a:fontRef idx="minor">
-            <a:schemeClr val="lt1"/>
-          </a:fontRef>
-        </p:style>
-        <p:txBody>
-          <a:bodyPr rtlCol="0" anchor="ctr"/>
-          <a:lstStyle/>
-          <a:p>
-            <a:pPr algn="ctr"/>
-            <a:endParaRPr lang="en-US" dirty="0"/>
-          </a:p>
-        </p:txBody>
-      </p:sp>
-      <p:sp>
-        <p:nvSpPr>
-          <p:cNvPr id="15" name="Rectangle 14">
-            <a:extLst>
-              <a:ext uri="{FF2B5EF4-FFF2-40B4-BE49-F238E27FC236}">
-                <a16:creationId xmlns:a16="http://schemas.microsoft.com/office/drawing/2014/main" id="{F6CD3855-57F8-4029-A84B-BCCAEDFA9C9B}"/>
-              </a:ext>
-            </a:extLst>
-          </p:cNvPr>
-          <p:cNvSpPr/>
-          <p:nvPr/>
-        </p:nvSpPr>
-        <p:spPr>
-          <a:xfrm>
-            <a:off x="6610746" y="45950"/>
-            <a:ext cx="5486400" cy="2200507"/>
-          </a:xfrm>
-          <a:prstGeom prst="rect">
-            <a:avLst/>
-          </a:prstGeom>
-          <a:solidFill>
-            <a:schemeClr val="bg1"/>
-          </a:solidFill>
-          <a:ln>
+            <a:extLst>
+              <a:ext uri="{909E8E84-426E-40DD-AFC4-6F175D3DCCD1}">
+                <a14:hiddenFill xmlns:a14="http://schemas.microsoft.com/office/drawing/2010/main">
+                  <a:solidFill>
+                    <a:srgbClr val="FFFFFF"/>
+                  </a:solidFill>
+                </a14:hiddenFill>
+              </a:ext>
+            </a:extLst>
+          </p:spPr>
+        </p:pic>
+        <p:pic>
+          <p:nvPicPr>
+            <p:cNvPr id="1028" name="Picture 4">
+              <a:extLst>
+                <a:ext uri="{FF2B5EF4-FFF2-40B4-BE49-F238E27FC236}">
+                  <a16:creationId xmlns:a16="http://schemas.microsoft.com/office/drawing/2014/main" id="{B9878EF2-FCFF-4C03-9E9C-7608A80F5914}"/>
+                </a:ext>
+              </a:extLst>
+            </p:cNvPr>
+            <p:cNvPicPr>
+              <a:picLocks noChangeAspect="1" noChangeArrowheads="1"/>
+            </p:cNvPicPr>
+            <p:nvPr/>
+          </p:nvPicPr>
+          <p:blipFill>
+            <a:blip r:embed="rId4" cstate="email">
+              <a:extLst>
+                <a:ext uri="{28A0092B-C50C-407E-A947-70E740481C1C}">
+                  <a14:useLocalDpi xmlns:a14="http://schemas.microsoft.com/office/drawing/2010/main"/>
+                </a:ext>
+              </a:extLst>
+            </a:blip>
+            <a:srcRect/>
+            <a:stretch>
+              <a:fillRect/>
+            </a:stretch>
+          </p:blipFill>
+          <p:spPr bwMode="auto">
+            <a:xfrm>
+              <a:off x="6620548" y="2328366"/>
+              <a:ext cx="5486400" cy="2200507"/>
+            </a:xfrm>
+            <a:prstGeom prst="rect">
+              <a:avLst/>
+            </a:prstGeom>
             <a:noFill/>
-          </a:ln>
-        </p:spPr>
-        <p:style>
-          <a:lnRef idx="2">
-            <a:schemeClr val="accent1">
-              <a:shade val="50000"/>
-            </a:schemeClr>
-          </a:lnRef>
-          <a:fillRef idx="1">
-            <a:schemeClr val="accent1"/>
-          </a:fillRef>
-          <a:effectRef idx="0">
-            <a:schemeClr val="accent1"/>
-          </a:effectRef>
-          <a:fontRef idx="minor">
-            <a:schemeClr val="lt1"/>
-          </a:fontRef>
-        </p:style>
-        <p:txBody>
-          <a:bodyPr rtlCol="0" anchor="ctr"/>
-          <a:lstStyle/>
-          <a:p>
-            <a:pPr algn="ctr"/>
-            <a:endParaRPr lang="en-US"/>
-          </a:p>
-        </p:txBody>
-      </p:sp>
-      <p:sp>
-        <p:nvSpPr>
-          <p:cNvPr id="17" name="Rectangle 16">
-            <a:extLst>
-              <a:ext uri="{FF2B5EF4-FFF2-40B4-BE49-F238E27FC236}">
-                <a16:creationId xmlns:a16="http://schemas.microsoft.com/office/drawing/2014/main" id="{A55BBC58-5239-41B9-B3BE-6A58CE147948}"/>
-              </a:ext>
-            </a:extLst>
-          </p:cNvPr>
-          <p:cNvSpPr/>
-          <p:nvPr/>
-        </p:nvSpPr>
-        <p:spPr>
-          <a:xfrm>
-            <a:off x="6605983" y="2320982"/>
-            <a:ext cx="5486400" cy="2200507"/>
-          </a:xfrm>
-          <a:prstGeom prst="rect">
-            <a:avLst/>
-          </a:prstGeom>
-          <a:solidFill>
-            <a:schemeClr val="bg1"/>
-          </a:solidFill>
-          <a:ln>
+            <a:extLst>
+              <a:ext uri="{909E8E84-426E-40DD-AFC4-6F175D3DCCD1}">
+                <a14:hiddenFill xmlns:a14="http://schemas.microsoft.com/office/drawing/2010/main">
+                  <a:solidFill>
+                    <a:srgbClr val="FFFFFF"/>
+                  </a:solidFill>
+                </a14:hiddenFill>
+              </a:ext>
+            </a:extLst>
+          </p:spPr>
+        </p:pic>
+        <p:pic>
+          <p:nvPicPr>
+            <p:cNvPr id="1030" name="Picture 6">
+              <a:extLst>
+                <a:ext uri="{FF2B5EF4-FFF2-40B4-BE49-F238E27FC236}">
+                  <a16:creationId xmlns:a16="http://schemas.microsoft.com/office/drawing/2014/main" id="{E31CDE85-5224-45E9-B59E-AB6ABFE779AD}"/>
+                </a:ext>
+              </a:extLst>
+            </p:cNvPr>
+            <p:cNvPicPr>
+              <a:picLocks noChangeAspect="1" noChangeArrowheads="1"/>
+            </p:cNvPicPr>
+            <p:nvPr/>
+          </p:nvPicPr>
+          <p:blipFill>
+            <a:blip r:embed="rId5" cstate="email">
+              <a:extLst>
+                <a:ext uri="{28A0092B-C50C-407E-A947-70E740481C1C}">
+                  <a14:useLocalDpi xmlns:a14="http://schemas.microsoft.com/office/drawing/2010/main"/>
+                </a:ext>
+              </a:extLst>
+            </a:blip>
+            <a:srcRect/>
+            <a:stretch>
+              <a:fillRect/>
+            </a:stretch>
+          </p:blipFill>
+          <p:spPr bwMode="auto">
+            <a:xfrm>
+              <a:off x="6605983" y="38566"/>
+              <a:ext cx="5486400" cy="2200507"/>
+            </a:xfrm>
+            <a:prstGeom prst="rect">
+              <a:avLst/>
+            </a:prstGeom>
             <a:noFill/>
-          </a:ln>
-        </p:spPr>
-        <p:style>
-          <a:lnRef idx="2">
-            <a:schemeClr val="accent1">
-              <a:shade val="50000"/>
-            </a:schemeClr>
-          </a:lnRef>
-          <a:fillRef idx="1">
-            <a:schemeClr val="accent1"/>
-          </a:fillRef>
-          <a:effectRef idx="0">
-            <a:schemeClr val="accent1"/>
-          </a:effectRef>
-          <a:fontRef idx="minor">
-            <a:schemeClr val="lt1"/>
-          </a:fontRef>
-        </p:style>
-        <p:txBody>
-          <a:bodyPr rtlCol="0" anchor="ctr"/>
-          <a:lstStyle/>
-          <a:p>
-            <a:pPr algn="ctr"/>
-            <a:endParaRPr lang="en-US"/>
-          </a:p>
-        </p:txBody>
-      </p:sp>
-      <p:sp>
-        <p:nvSpPr>
-          <p:cNvPr id="19" name="Rectangle 18">
-            <a:extLst>
-              <a:ext uri="{FF2B5EF4-FFF2-40B4-BE49-F238E27FC236}">
-                <a16:creationId xmlns:a16="http://schemas.microsoft.com/office/drawing/2014/main" id="{28F97D12-DA68-4C2D-A558-71450CA2722D}"/>
-              </a:ext>
-            </a:extLst>
-          </p:cNvPr>
-          <p:cNvSpPr/>
-          <p:nvPr/>
-        </p:nvSpPr>
-        <p:spPr>
-          <a:xfrm>
-            <a:off x="6596457" y="4608193"/>
-            <a:ext cx="5486400" cy="2200507"/>
-          </a:xfrm>
-          <a:prstGeom prst="rect">
-            <a:avLst/>
-          </a:prstGeom>
-          <a:solidFill>
-            <a:schemeClr val="bg1"/>
-          </a:solidFill>
-          <a:ln>
+            <a:extLst>
+              <a:ext uri="{909E8E84-426E-40DD-AFC4-6F175D3DCCD1}">
+                <a14:hiddenFill xmlns:a14="http://schemas.microsoft.com/office/drawing/2010/main">
+                  <a:solidFill>
+                    <a:srgbClr val="FFFFFF"/>
+                  </a:solidFill>
+                </a14:hiddenFill>
+              </a:ext>
+            </a:extLst>
+          </p:spPr>
+        </p:pic>
+        <p:pic>
+          <p:nvPicPr>
+            <p:cNvPr id="1032" name="Picture 8">
+              <a:extLst>
+                <a:ext uri="{FF2B5EF4-FFF2-40B4-BE49-F238E27FC236}">
+                  <a16:creationId xmlns:a16="http://schemas.microsoft.com/office/drawing/2014/main" id="{1A276BFA-A80E-46F7-9404-0477DC0B151B}"/>
+                </a:ext>
+              </a:extLst>
+            </p:cNvPr>
+            <p:cNvPicPr>
+              <a:picLocks noChangeAspect="1" noChangeArrowheads="1"/>
+            </p:cNvPicPr>
+            <p:nvPr/>
+          </p:nvPicPr>
+          <p:blipFill rotWithShape="1">
+            <a:blip r:embed="rId6" cstate="email">
+              <a:extLst>
+                <a:ext uri="{28A0092B-C50C-407E-A947-70E740481C1C}">
+                  <a14:useLocalDpi xmlns:a14="http://schemas.microsoft.com/office/drawing/2010/main"/>
+                </a:ext>
+              </a:extLst>
+            </a:blip>
+            <a:srcRect/>
+            <a:stretch/>
+          </p:blipFill>
+          <p:spPr bwMode="auto">
+            <a:xfrm>
+              <a:off x="10296275" y="4999103"/>
+              <a:ext cx="1484674" cy="1418686"/>
+            </a:xfrm>
+            <a:prstGeom prst="rect">
+              <a:avLst/>
+            </a:prstGeom>
             <a:noFill/>
-          </a:ln>
-        </p:spPr>
-        <p:style>
-          <a:lnRef idx="2">
-            <a:schemeClr val="accent1">
-              <a:shade val="50000"/>
-            </a:schemeClr>
-          </a:lnRef>
-          <a:fillRef idx="1">
-            <a:schemeClr val="accent1"/>
-          </a:fillRef>
-          <a:effectRef idx="0">
-            <a:schemeClr val="accent1"/>
-          </a:effectRef>
-          <a:fontRef idx="minor">
-            <a:schemeClr val="lt1"/>
-          </a:fontRef>
-        </p:style>
-        <p:txBody>
-          <a:bodyPr rtlCol="0" anchor="ctr"/>
-          <a:lstStyle/>
-          <a:p>
-            <a:pPr algn="ctr"/>
-            <a:endParaRPr lang="en-US"/>
-          </a:p>
-        </p:txBody>
-      </p:sp>
-      <p:pic>
-        <p:nvPicPr>
-          <p:cNvPr id="1026" name="Picture 2">
-            <a:extLst>
-              <a:ext uri="{FF2B5EF4-FFF2-40B4-BE49-F238E27FC236}">
-                <a16:creationId xmlns:a16="http://schemas.microsoft.com/office/drawing/2014/main" id="{EEE78AC3-9ABC-478E-985A-EF0E83A8DBAE}"/>
-              </a:ext>
-            </a:extLst>
-          </p:cNvPr>
-          <p:cNvPicPr>
-            <a:picLocks noChangeAspect="1" noChangeArrowheads="1"/>
-          </p:cNvPicPr>
-          <p:nvPr/>
-        </p:nvPicPr>
-        <p:blipFill>
-          <a:blip r:embed="rId3" cstate="email">
-            <a:extLst>
-              <a:ext uri="{28A0092B-C50C-407E-A947-70E740481C1C}">
-                <a14:useLocalDpi xmlns:a14="http://schemas.microsoft.com/office/drawing/2010/main"/>
-              </a:ext>
-            </a:extLst>
-          </a:blip>
-          <a:srcRect/>
-          <a:stretch>
-            <a:fillRect/>
-          </a:stretch>
-        </p:blipFill>
-        <p:spPr bwMode="auto">
-          <a:xfrm>
-            <a:off x="6620548" y="4623663"/>
-            <a:ext cx="5486400" cy="2200507"/>
-          </a:xfrm>
-          <a:prstGeom prst="rect">
-            <a:avLst/>
-          </a:prstGeom>
-          <a:noFill/>
-          <a:extLst>
-            <a:ext uri="{909E8E84-426E-40DD-AFC4-6F175D3DCCD1}">
-              <a14:hiddenFill xmlns:a14="http://schemas.microsoft.com/office/drawing/2010/main">
-                <a:solidFill>
-                  <a:srgbClr val="FFFFFF"/>
-                </a:solidFill>
-              </a14:hiddenFill>
-            </a:ext>
-          </a:extLst>
-        </p:spPr>
-      </p:pic>
-      <p:pic>
-        <p:nvPicPr>
-          <p:cNvPr id="1028" name="Picture 4">
-            <a:extLst>
-              <a:ext uri="{FF2B5EF4-FFF2-40B4-BE49-F238E27FC236}">
-                <a16:creationId xmlns:a16="http://schemas.microsoft.com/office/drawing/2014/main" id="{B9878EF2-FCFF-4C03-9E9C-7608A80F5914}"/>
-              </a:ext>
-            </a:extLst>
-          </p:cNvPr>
-          <p:cNvPicPr>
-            <a:picLocks noChangeAspect="1" noChangeArrowheads="1"/>
-          </p:cNvPicPr>
-          <p:nvPr/>
-        </p:nvPicPr>
-        <p:blipFill>
-          <a:blip r:embed="rId4" cstate="email">
-            <a:extLst>
-              <a:ext uri="{28A0092B-C50C-407E-A947-70E740481C1C}">
-                <a14:useLocalDpi xmlns:a14="http://schemas.microsoft.com/office/drawing/2010/main"/>
-              </a:ext>
-            </a:extLst>
-          </a:blip>
-          <a:srcRect/>
-          <a:stretch>
-            <a:fillRect/>
-          </a:stretch>
-        </p:blipFill>
-        <p:spPr bwMode="auto">
-          <a:xfrm>
-            <a:off x="6620548" y="2328366"/>
-            <a:ext cx="5486400" cy="2200507"/>
-          </a:xfrm>
-          <a:prstGeom prst="rect">
-            <a:avLst/>
-          </a:prstGeom>
-          <a:noFill/>
-          <a:extLst>
-            <a:ext uri="{909E8E84-426E-40DD-AFC4-6F175D3DCCD1}">
-              <a14:hiddenFill xmlns:a14="http://schemas.microsoft.com/office/drawing/2010/main">
-                <a:solidFill>
-                  <a:srgbClr val="FFFFFF"/>
-                </a:solidFill>
-              </a14:hiddenFill>
-            </a:ext>
-          </a:extLst>
-        </p:spPr>
-      </p:pic>
-      <p:pic>
-        <p:nvPicPr>
-          <p:cNvPr id="1030" name="Picture 6">
-            <a:extLst>
-              <a:ext uri="{FF2B5EF4-FFF2-40B4-BE49-F238E27FC236}">
-                <a16:creationId xmlns:a16="http://schemas.microsoft.com/office/drawing/2014/main" id="{E31CDE85-5224-45E9-B59E-AB6ABFE779AD}"/>
-              </a:ext>
-            </a:extLst>
-          </p:cNvPr>
-          <p:cNvPicPr>
-            <a:picLocks noChangeAspect="1" noChangeArrowheads="1"/>
-          </p:cNvPicPr>
-          <p:nvPr/>
-        </p:nvPicPr>
-        <p:blipFill>
-          <a:blip r:embed="rId5" cstate="email">
-            <a:extLst>
-              <a:ext uri="{28A0092B-C50C-407E-A947-70E740481C1C}">
-                <a14:useLocalDpi xmlns:a14="http://schemas.microsoft.com/office/drawing/2010/main"/>
-              </a:ext>
-            </a:extLst>
-          </a:blip>
-          <a:srcRect/>
-          <a:stretch>
-            <a:fillRect/>
-          </a:stretch>
-        </p:blipFill>
-        <p:spPr bwMode="auto">
-          <a:xfrm>
-            <a:off x="6605983" y="38566"/>
-            <a:ext cx="5486400" cy="2200507"/>
-          </a:xfrm>
-          <a:prstGeom prst="rect">
-            <a:avLst/>
-          </a:prstGeom>
-          <a:noFill/>
-          <a:extLst>
-            <a:ext uri="{909E8E84-426E-40DD-AFC4-6F175D3DCCD1}">
-              <a14:hiddenFill xmlns:a14="http://schemas.microsoft.com/office/drawing/2010/main">
-                <a:solidFill>
-                  <a:srgbClr val="FFFFFF"/>
-                </a:solidFill>
-              </a14:hiddenFill>
-            </a:ext>
-          </a:extLst>
-        </p:spPr>
-      </p:pic>
-      <p:pic>
-        <p:nvPicPr>
-          <p:cNvPr id="1032" name="Picture 8">
-            <a:extLst>
-              <a:ext uri="{FF2B5EF4-FFF2-40B4-BE49-F238E27FC236}">
-                <a16:creationId xmlns:a16="http://schemas.microsoft.com/office/drawing/2014/main" id="{1A276BFA-A80E-46F7-9404-0477DC0B151B}"/>
-              </a:ext>
-            </a:extLst>
-          </p:cNvPr>
-          <p:cNvPicPr>
-            <a:picLocks noChangeAspect="1" noChangeArrowheads="1"/>
-          </p:cNvPicPr>
-          <p:nvPr/>
-        </p:nvPicPr>
-        <p:blipFill rotWithShape="1">
-          <a:blip r:embed="rId6" cstate="email">
-            <a:extLst>
-              <a:ext uri="{28A0092B-C50C-407E-A947-70E740481C1C}">
-                <a14:useLocalDpi xmlns:a14="http://schemas.microsoft.com/office/drawing/2010/main"/>
-              </a:ext>
-            </a:extLst>
-          </a:blip>
-          <a:srcRect/>
-          <a:stretch/>
-        </p:blipFill>
-        <p:spPr bwMode="auto">
-          <a:xfrm>
-            <a:off x="10296275" y="4999103"/>
-            <a:ext cx="1484674" cy="1418686"/>
-          </a:xfrm>
-          <a:prstGeom prst="rect">
-            <a:avLst/>
-          </a:prstGeom>
-          <a:noFill/>
-          <a:extLst>
-            <a:ext uri="{909E8E84-426E-40DD-AFC4-6F175D3DCCD1}">
-              <a14:hiddenFill xmlns:a14="http://schemas.microsoft.com/office/drawing/2010/main">
-                <a:solidFill>
-                  <a:srgbClr val="FFFFFF"/>
-                </a:solidFill>
-              </a14:hiddenFill>
-            </a:ext>
-          </a:extLst>
-        </p:spPr>
-      </p:pic>
+            <a:extLst>
+              <a:ext uri="{909E8E84-426E-40DD-AFC4-6F175D3DCCD1}">
+                <a14:hiddenFill xmlns:a14="http://schemas.microsoft.com/office/drawing/2010/main">
+                  <a:solidFill>
+                    <a:srgbClr val="FFFFFF"/>
+                  </a:solidFill>
+                </a14:hiddenFill>
+              </a:ext>
+            </a:extLst>
+          </p:spPr>
+        </p:pic>
+        <p:sp>
+          <p:nvSpPr>
+            <p:cNvPr id="4" name="TextBox 3">
+              <a:extLst>
+                <a:ext uri="{FF2B5EF4-FFF2-40B4-BE49-F238E27FC236}">
+                  <a16:creationId xmlns:a16="http://schemas.microsoft.com/office/drawing/2014/main" id="{4BA19EB2-877A-40BF-8195-065D609A6CCF}"/>
+                </a:ext>
+              </a:extLst>
+            </p:cNvPr>
+            <p:cNvSpPr txBox="1"/>
+            <p:nvPr/>
+          </p:nvSpPr>
+          <p:spPr>
+            <a:xfrm>
+              <a:off x="7225664" y="272043"/>
+              <a:ext cx="675185" cy="430887"/>
+            </a:xfrm>
+            <a:prstGeom prst="rect">
+              <a:avLst/>
+            </a:prstGeom>
+            <a:noFill/>
+          </p:spPr>
+          <p:txBody>
+            <a:bodyPr wrap="none" rtlCol="0">
+              <a:spAutoFit/>
+            </a:bodyPr>
+            <a:lstStyle/>
+            <a:p>
+              <a:r>
+                <a:rPr lang="en-US" sz="2200" b="1" dirty="0"/>
+                <a:t>30%</a:t>
+              </a:r>
+            </a:p>
+          </p:txBody>
+        </p:sp>
+        <p:sp>
+          <p:nvSpPr>
+            <p:cNvPr id="5" name="TextBox 4">
+              <a:extLst>
+                <a:ext uri="{FF2B5EF4-FFF2-40B4-BE49-F238E27FC236}">
+                  <a16:creationId xmlns:a16="http://schemas.microsoft.com/office/drawing/2014/main" id="{A4305381-D3FB-48D6-93DF-3C32F9D8CA3E}"/>
+                </a:ext>
+              </a:extLst>
+            </p:cNvPr>
+            <p:cNvSpPr txBox="1"/>
+            <p:nvPr/>
+          </p:nvSpPr>
+          <p:spPr>
+            <a:xfrm>
+              <a:off x="7247433" y="2561396"/>
+              <a:ext cx="675185" cy="430887"/>
+            </a:xfrm>
+            <a:prstGeom prst="rect">
+              <a:avLst/>
+            </a:prstGeom>
+            <a:noFill/>
+          </p:spPr>
+          <p:txBody>
+            <a:bodyPr wrap="none" rtlCol="0">
+              <a:spAutoFit/>
+            </a:bodyPr>
+            <a:lstStyle/>
+            <a:p>
+              <a:r>
+                <a:rPr lang="en-US" sz="2200" b="1" dirty="0"/>
+                <a:t>60%</a:t>
+              </a:r>
+            </a:p>
+          </p:txBody>
+        </p:sp>
+        <p:sp>
+          <p:nvSpPr>
+            <p:cNvPr id="6" name="TextBox 5">
+              <a:extLst>
+                <a:ext uri="{FF2B5EF4-FFF2-40B4-BE49-F238E27FC236}">
+                  <a16:creationId xmlns:a16="http://schemas.microsoft.com/office/drawing/2014/main" id="{ED072405-E679-4E0C-9055-59FBCBB1E22B}"/>
+                </a:ext>
+              </a:extLst>
+            </p:cNvPr>
+            <p:cNvSpPr txBox="1"/>
+            <p:nvPr/>
+          </p:nvSpPr>
+          <p:spPr>
+            <a:xfrm>
+              <a:off x="7225663" y="4855204"/>
+              <a:ext cx="675185" cy="430887"/>
+            </a:xfrm>
+            <a:prstGeom prst="rect">
+              <a:avLst/>
+            </a:prstGeom>
+            <a:noFill/>
+          </p:spPr>
+          <p:txBody>
+            <a:bodyPr wrap="none" rtlCol="0">
+              <a:spAutoFit/>
+            </a:bodyPr>
+            <a:lstStyle/>
+            <a:p>
+              <a:r>
+                <a:rPr lang="en-US" sz="2200" b="1" dirty="0"/>
+                <a:t>90%</a:t>
+              </a:r>
+            </a:p>
+          </p:txBody>
+        </p:sp>
+      </p:grpSp>
     </p:spTree>
     <p:extLst>
       <p:ext uri="{BB962C8B-B14F-4D97-AF65-F5344CB8AC3E}">
@@ -6953,10 +7247,10 @@
       </p:sp>
       <p:pic>
         <p:nvPicPr>
-          <p:cNvPr id="10" name="Content Placeholder 9" descr="Scatter chart&#10;&#10;Description automatically generated">
-            <a:extLst>
-              <a:ext uri="{FF2B5EF4-FFF2-40B4-BE49-F238E27FC236}">
-                <a16:creationId xmlns:a16="http://schemas.microsoft.com/office/drawing/2014/main" id="{02D9DE43-86D4-4F51-B522-BC5D937FEB63}"/>
+          <p:cNvPr id="11" name="Content Placeholder 10" descr="Scatter chart&#10;&#10;Description automatically generated">
+            <a:extLst>
+              <a:ext uri="{FF2B5EF4-FFF2-40B4-BE49-F238E27FC236}">
+                <a16:creationId xmlns:a16="http://schemas.microsoft.com/office/drawing/2014/main" id="{2D3148FA-AB3F-4EB6-9B2D-9184F17E92D3}"/>
               </a:ext>
             </a:extLst>
           </p:cNvPr>
@@ -6975,17 +7269,17 @@
         </p:blipFill>
         <p:spPr>
           <a:xfrm>
-            <a:off x="356711" y="1743075"/>
-            <a:ext cx="4818888" cy="4818888"/>
+            <a:off x="494347" y="1986915"/>
+            <a:ext cx="4572000" cy="4572000"/>
           </a:xfrm>
         </p:spPr>
       </p:pic>
       <p:pic>
         <p:nvPicPr>
-          <p:cNvPr id="13" name="Content Placeholder 12" descr="Chart, scatter chart&#10;&#10;Description automatically generated">
-            <a:extLst>
-              <a:ext uri="{FF2B5EF4-FFF2-40B4-BE49-F238E27FC236}">
-                <a16:creationId xmlns:a16="http://schemas.microsoft.com/office/drawing/2014/main" id="{256FF0DD-C81B-4E78-B77D-C28231D75E33}"/>
+          <p:cNvPr id="14" name="Content Placeholder 13" descr="Chart, scatter chart&#10;&#10;Description automatically generated">
+            <a:extLst>
+              <a:ext uri="{FF2B5EF4-FFF2-40B4-BE49-F238E27FC236}">
+                <a16:creationId xmlns:a16="http://schemas.microsoft.com/office/drawing/2014/main" id="{FDF5A770-8721-47B7-9BFC-97A196EB37B1}"/>
               </a:ext>
             </a:extLst>
           </p:cNvPr>
@@ -7004,8 +7298,8 @@
         </p:blipFill>
         <p:spPr>
           <a:xfrm>
-            <a:off x="5701824" y="1743075"/>
-            <a:ext cx="4818888" cy="4818888"/>
+            <a:off x="5839460" y="1986915"/>
+            <a:ext cx="4572000" cy="4572000"/>
           </a:xfrm>
         </p:spPr>
       </p:pic>
@@ -7239,402 +7533,528 @@
           </a:p>
         </p:txBody>
       </p:sp>
-      <p:sp>
-        <p:nvSpPr>
-          <p:cNvPr id="4" name="Rectangle 3">
-            <a:extLst>
-              <a:ext uri="{FF2B5EF4-FFF2-40B4-BE49-F238E27FC236}">
-                <a16:creationId xmlns:a16="http://schemas.microsoft.com/office/drawing/2014/main" id="{D5205623-CD77-4FCE-A351-96C9B2EA2C3B}"/>
-              </a:ext>
-            </a:extLst>
-          </p:cNvPr>
-          <p:cNvSpPr/>
+      <p:grpSp>
+        <p:nvGrpSpPr>
+          <p:cNvPr id="10" name="Group 9">
+            <a:extLst>
+              <a:ext uri="{FF2B5EF4-FFF2-40B4-BE49-F238E27FC236}">
+                <a16:creationId xmlns:a16="http://schemas.microsoft.com/office/drawing/2014/main" id="{B1F0373C-987E-4536-98FD-E30906852ABA}"/>
+              </a:ext>
+            </a:extLst>
+          </p:cNvPr>
+          <p:cNvGrpSpPr/>
           <p:nvPr/>
-        </p:nvSpPr>
-        <p:spPr>
-          <a:xfrm flipV="1">
+        </p:nvGrpSpPr>
+        <p:grpSpPr>
+          <a:xfrm>
             <a:off x="6467475" y="0"/>
             <a:ext cx="5724524" cy="6858000"/>
+            <a:chOff x="6467475" y="0"/>
+            <a:chExt cx="5724524" cy="6858000"/>
           </a:xfrm>
-          <a:prstGeom prst="rect">
-            <a:avLst/>
-          </a:prstGeom>
-          <a:solidFill>
-            <a:schemeClr val="bg1">
-              <a:lumMod val="65000"/>
-            </a:schemeClr>
-          </a:solidFill>
-          <a:ln>
+        </p:grpSpPr>
+        <p:sp>
+          <p:nvSpPr>
+            <p:cNvPr id="4" name="Rectangle 3">
+              <a:extLst>
+                <a:ext uri="{FF2B5EF4-FFF2-40B4-BE49-F238E27FC236}">
+                  <a16:creationId xmlns:a16="http://schemas.microsoft.com/office/drawing/2014/main" id="{D5205623-CD77-4FCE-A351-96C9B2EA2C3B}"/>
+                </a:ext>
+              </a:extLst>
+            </p:cNvPr>
+            <p:cNvSpPr/>
+            <p:nvPr/>
+          </p:nvSpPr>
+          <p:spPr>
+            <a:xfrm flipV="1">
+              <a:off x="6467475" y="0"/>
+              <a:ext cx="5724524" cy="6858000"/>
+            </a:xfrm>
+            <a:prstGeom prst="rect">
+              <a:avLst/>
+            </a:prstGeom>
+            <a:solidFill>
+              <a:schemeClr val="bg1">
+                <a:lumMod val="65000"/>
+              </a:schemeClr>
+            </a:solidFill>
+            <a:ln>
+              <a:noFill/>
+            </a:ln>
+          </p:spPr>
+          <p:style>
+            <a:lnRef idx="2">
+              <a:schemeClr val="accent1">
+                <a:shade val="50000"/>
+              </a:schemeClr>
+            </a:lnRef>
+            <a:fillRef idx="1">
+              <a:schemeClr val="accent1"/>
+            </a:fillRef>
+            <a:effectRef idx="0">
+              <a:schemeClr val="accent1"/>
+            </a:effectRef>
+            <a:fontRef idx="minor">
+              <a:schemeClr val="lt1"/>
+            </a:fontRef>
+          </p:style>
+          <p:txBody>
+            <a:bodyPr rtlCol="0" anchor="ctr"/>
+            <a:lstStyle/>
+            <a:p>
+              <a:pPr algn="ctr"/>
+              <a:endParaRPr lang="en-US" dirty="0"/>
+            </a:p>
+          </p:txBody>
+        </p:sp>
+        <p:sp>
+          <p:nvSpPr>
+            <p:cNvPr id="5" name="Rectangle 4">
+              <a:extLst>
+                <a:ext uri="{FF2B5EF4-FFF2-40B4-BE49-F238E27FC236}">
+                  <a16:creationId xmlns:a16="http://schemas.microsoft.com/office/drawing/2014/main" id="{4055F6F6-0C4D-4A64-8ADE-B783A223239B}"/>
+                </a:ext>
+              </a:extLst>
+            </p:cNvPr>
+            <p:cNvSpPr/>
+            <p:nvPr/>
+          </p:nvSpPr>
+          <p:spPr>
+            <a:xfrm>
+              <a:off x="6610746" y="45950"/>
+              <a:ext cx="5486400" cy="2200507"/>
+            </a:xfrm>
+            <a:prstGeom prst="rect">
+              <a:avLst/>
+            </a:prstGeom>
+            <a:solidFill>
+              <a:schemeClr val="bg1"/>
+            </a:solidFill>
+            <a:ln>
+              <a:noFill/>
+            </a:ln>
+          </p:spPr>
+          <p:style>
+            <a:lnRef idx="2">
+              <a:schemeClr val="accent1">
+                <a:shade val="50000"/>
+              </a:schemeClr>
+            </a:lnRef>
+            <a:fillRef idx="1">
+              <a:schemeClr val="accent1"/>
+            </a:fillRef>
+            <a:effectRef idx="0">
+              <a:schemeClr val="accent1"/>
+            </a:effectRef>
+            <a:fontRef idx="minor">
+              <a:schemeClr val="lt1"/>
+            </a:fontRef>
+          </p:style>
+          <p:txBody>
+            <a:bodyPr rtlCol="0" anchor="ctr"/>
+            <a:lstStyle/>
+            <a:p>
+              <a:pPr algn="ctr"/>
+              <a:endParaRPr lang="en-US" dirty="0"/>
+            </a:p>
+          </p:txBody>
+        </p:sp>
+        <p:sp>
+          <p:nvSpPr>
+            <p:cNvPr id="11" name="Rectangle 10">
+              <a:extLst>
+                <a:ext uri="{FF2B5EF4-FFF2-40B4-BE49-F238E27FC236}">
+                  <a16:creationId xmlns:a16="http://schemas.microsoft.com/office/drawing/2014/main" id="{A300B242-F92D-4713-8893-E012B052750A}"/>
+                </a:ext>
+              </a:extLst>
+            </p:cNvPr>
+            <p:cNvSpPr/>
+            <p:nvPr/>
+          </p:nvSpPr>
+          <p:spPr>
+            <a:xfrm>
+              <a:off x="6605983" y="2320982"/>
+              <a:ext cx="5486400" cy="2200507"/>
+            </a:xfrm>
+            <a:prstGeom prst="rect">
+              <a:avLst/>
+            </a:prstGeom>
+            <a:solidFill>
+              <a:schemeClr val="bg1"/>
+            </a:solidFill>
+            <a:ln>
+              <a:noFill/>
+            </a:ln>
+          </p:spPr>
+          <p:style>
+            <a:lnRef idx="2">
+              <a:schemeClr val="accent1">
+                <a:shade val="50000"/>
+              </a:schemeClr>
+            </a:lnRef>
+            <a:fillRef idx="1">
+              <a:schemeClr val="accent1"/>
+            </a:fillRef>
+            <a:effectRef idx="0">
+              <a:schemeClr val="accent1"/>
+            </a:effectRef>
+            <a:fontRef idx="minor">
+              <a:schemeClr val="lt1"/>
+            </a:fontRef>
+          </p:style>
+          <p:txBody>
+            <a:bodyPr rtlCol="0" anchor="ctr"/>
+            <a:lstStyle/>
+            <a:p>
+              <a:pPr algn="ctr"/>
+              <a:endParaRPr lang="en-US"/>
+            </a:p>
+          </p:txBody>
+        </p:sp>
+        <p:sp>
+          <p:nvSpPr>
+            <p:cNvPr id="13" name="Rectangle 12">
+              <a:extLst>
+                <a:ext uri="{FF2B5EF4-FFF2-40B4-BE49-F238E27FC236}">
+                  <a16:creationId xmlns:a16="http://schemas.microsoft.com/office/drawing/2014/main" id="{282A086F-6910-4F0F-9530-0524BD61E843}"/>
+                </a:ext>
+              </a:extLst>
+            </p:cNvPr>
+            <p:cNvSpPr/>
+            <p:nvPr/>
+          </p:nvSpPr>
+          <p:spPr>
+            <a:xfrm>
+              <a:off x="6596457" y="4608193"/>
+              <a:ext cx="5486400" cy="2200507"/>
+            </a:xfrm>
+            <a:prstGeom prst="rect">
+              <a:avLst/>
+            </a:prstGeom>
+            <a:solidFill>
+              <a:schemeClr val="bg1"/>
+            </a:solidFill>
+            <a:ln>
+              <a:noFill/>
+            </a:ln>
+          </p:spPr>
+          <p:style>
+            <a:lnRef idx="2">
+              <a:schemeClr val="accent1">
+                <a:shade val="50000"/>
+              </a:schemeClr>
+            </a:lnRef>
+            <a:fillRef idx="1">
+              <a:schemeClr val="accent1"/>
+            </a:fillRef>
+            <a:effectRef idx="0">
+              <a:schemeClr val="accent1"/>
+            </a:effectRef>
+            <a:fontRef idx="minor">
+              <a:schemeClr val="lt1"/>
+            </a:fontRef>
+          </p:style>
+          <p:txBody>
+            <a:bodyPr rtlCol="0" anchor="ctr"/>
+            <a:lstStyle/>
+            <a:p>
+              <a:pPr algn="ctr"/>
+              <a:endParaRPr lang="en-US"/>
+            </a:p>
+          </p:txBody>
+        </p:sp>
+        <p:pic>
+          <p:nvPicPr>
+            <p:cNvPr id="2050" name="Picture 2">
+              <a:extLst>
+                <a:ext uri="{FF2B5EF4-FFF2-40B4-BE49-F238E27FC236}">
+                  <a16:creationId xmlns:a16="http://schemas.microsoft.com/office/drawing/2014/main" id="{9192433C-CA9C-4641-ADBB-AF35F2A56FB7}"/>
+                </a:ext>
+              </a:extLst>
+            </p:cNvPr>
+            <p:cNvPicPr>
+              <a:picLocks noChangeAspect="1" noChangeArrowheads="1"/>
+            </p:cNvPicPr>
+            <p:nvPr/>
+          </p:nvPicPr>
+          <p:blipFill>
+            <a:blip r:embed="rId3" cstate="email">
+              <a:extLst>
+                <a:ext uri="{28A0092B-C50C-407E-A947-70E740481C1C}">
+                  <a14:useLocalDpi xmlns:a14="http://schemas.microsoft.com/office/drawing/2010/main"/>
+                </a:ext>
+              </a:extLst>
+            </a:blip>
+            <a:srcRect/>
+            <a:stretch>
+              <a:fillRect/>
+            </a:stretch>
+          </p:blipFill>
+          <p:spPr bwMode="auto">
+            <a:xfrm>
+              <a:off x="6604820" y="2358865"/>
+              <a:ext cx="5486400" cy="2200507"/>
+            </a:xfrm>
+            <a:prstGeom prst="rect">
+              <a:avLst/>
+            </a:prstGeom>
             <a:noFill/>
-          </a:ln>
-        </p:spPr>
-        <p:style>
-          <a:lnRef idx="2">
-            <a:schemeClr val="accent1">
-              <a:shade val="50000"/>
-            </a:schemeClr>
-          </a:lnRef>
-          <a:fillRef idx="1">
-            <a:schemeClr val="accent1"/>
-          </a:fillRef>
-          <a:effectRef idx="0">
-            <a:schemeClr val="accent1"/>
-          </a:effectRef>
-          <a:fontRef idx="minor">
-            <a:schemeClr val="lt1"/>
-          </a:fontRef>
-        </p:style>
-        <p:txBody>
-          <a:bodyPr rtlCol="0" anchor="ctr"/>
-          <a:lstStyle/>
-          <a:p>
-            <a:pPr algn="ctr"/>
-            <a:endParaRPr lang="en-US" dirty="0"/>
-          </a:p>
-        </p:txBody>
-      </p:sp>
-      <p:sp>
-        <p:nvSpPr>
-          <p:cNvPr id="5" name="Rectangle 4">
-            <a:extLst>
-              <a:ext uri="{FF2B5EF4-FFF2-40B4-BE49-F238E27FC236}">
-                <a16:creationId xmlns:a16="http://schemas.microsoft.com/office/drawing/2014/main" id="{4055F6F6-0C4D-4A64-8ADE-B783A223239B}"/>
-              </a:ext>
-            </a:extLst>
-          </p:cNvPr>
-          <p:cNvSpPr/>
-          <p:nvPr/>
-        </p:nvSpPr>
-        <p:spPr>
-          <a:xfrm>
-            <a:off x="6610746" y="45950"/>
-            <a:ext cx="5486400" cy="2200507"/>
-          </a:xfrm>
-          <a:prstGeom prst="rect">
-            <a:avLst/>
-          </a:prstGeom>
-          <a:solidFill>
-            <a:schemeClr val="bg1"/>
-          </a:solidFill>
-          <a:ln>
+            <a:extLst>
+              <a:ext uri="{909E8E84-426E-40DD-AFC4-6F175D3DCCD1}">
+                <a14:hiddenFill xmlns:a14="http://schemas.microsoft.com/office/drawing/2010/main">
+                  <a:solidFill>
+                    <a:srgbClr val="FFFFFF"/>
+                  </a:solidFill>
+                </a14:hiddenFill>
+              </a:ext>
+            </a:extLst>
+          </p:spPr>
+        </p:pic>
+        <p:pic>
+          <p:nvPicPr>
+            <p:cNvPr id="2054" name="Picture 6">
+              <a:extLst>
+                <a:ext uri="{FF2B5EF4-FFF2-40B4-BE49-F238E27FC236}">
+                  <a16:creationId xmlns:a16="http://schemas.microsoft.com/office/drawing/2014/main" id="{3BFC11C0-9C31-40BD-B3D0-04F89E7091BB}"/>
+                </a:ext>
+              </a:extLst>
+            </p:cNvPr>
+            <p:cNvPicPr>
+              <a:picLocks noChangeAspect="1" noChangeArrowheads="1"/>
+            </p:cNvPicPr>
+            <p:nvPr/>
+          </p:nvPicPr>
+          <p:blipFill>
+            <a:blip r:embed="rId4" cstate="email">
+              <a:extLst>
+                <a:ext uri="{28A0092B-C50C-407E-A947-70E740481C1C}">
+                  <a14:useLocalDpi xmlns:a14="http://schemas.microsoft.com/office/drawing/2010/main"/>
+                </a:ext>
+              </a:extLst>
+            </a:blip>
+            <a:srcRect/>
+            <a:stretch>
+              <a:fillRect/>
+            </a:stretch>
+          </p:blipFill>
+          <p:spPr bwMode="auto">
+            <a:xfrm>
+              <a:off x="6604820" y="4623701"/>
+              <a:ext cx="5486400" cy="2200507"/>
+            </a:xfrm>
+            <a:prstGeom prst="rect">
+              <a:avLst/>
+            </a:prstGeom>
             <a:noFill/>
-          </a:ln>
-        </p:spPr>
-        <p:style>
-          <a:lnRef idx="2">
-            <a:schemeClr val="accent1">
-              <a:shade val="50000"/>
-            </a:schemeClr>
-          </a:lnRef>
-          <a:fillRef idx="1">
-            <a:schemeClr val="accent1"/>
-          </a:fillRef>
-          <a:effectRef idx="0">
-            <a:schemeClr val="accent1"/>
-          </a:effectRef>
-          <a:fontRef idx="minor">
-            <a:schemeClr val="lt1"/>
-          </a:fontRef>
-        </p:style>
-        <p:txBody>
-          <a:bodyPr rtlCol="0" anchor="ctr"/>
-          <a:lstStyle/>
-          <a:p>
-            <a:pPr algn="ctr"/>
-            <a:endParaRPr lang="en-US" dirty="0"/>
-          </a:p>
-        </p:txBody>
-      </p:sp>
-      <p:sp>
-        <p:nvSpPr>
-          <p:cNvPr id="11" name="Rectangle 10">
-            <a:extLst>
-              <a:ext uri="{FF2B5EF4-FFF2-40B4-BE49-F238E27FC236}">
-                <a16:creationId xmlns:a16="http://schemas.microsoft.com/office/drawing/2014/main" id="{A300B242-F92D-4713-8893-E012B052750A}"/>
-              </a:ext>
-            </a:extLst>
-          </p:cNvPr>
-          <p:cNvSpPr/>
-          <p:nvPr/>
-        </p:nvSpPr>
-        <p:spPr>
-          <a:xfrm>
-            <a:off x="6605983" y="2320982"/>
-            <a:ext cx="5486400" cy="2200507"/>
-          </a:xfrm>
-          <a:prstGeom prst="rect">
-            <a:avLst/>
-          </a:prstGeom>
-          <a:solidFill>
-            <a:schemeClr val="bg1"/>
-          </a:solidFill>
-          <a:ln>
+            <a:extLst>
+              <a:ext uri="{909E8E84-426E-40DD-AFC4-6F175D3DCCD1}">
+                <a14:hiddenFill xmlns:a14="http://schemas.microsoft.com/office/drawing/2010/main">
+                  <a:solidFill>
+                    <a:srgbClr val="FFFFFF"/>
+                  </a:solidFill>
+                </a14:hiddenFill>
+              </a:ext>
+            </a:extLst>
+          </p:spPr>
+        </p:pic>
+        <p:pic>
+          <p:nvPicPr>
+            <p:cNvPr id="22" name="Picture 8">
+              <a:extLst>
+                <a:ext uri="{FF2B5EF4-FFF2-40B4-BE49-F238E27FC236}">
+                  <a16:creationId xmlns:a16="http://schemas.microsoft.com/office/drawing/2014/main" id="{477E9EA0-6424-4D76-AF8D-FAE95F0F2051}"/>
+                </a:ext>
+              </a:extLst>
+            </p:cNvPr>
+            <p:cNvPicPr>
+              <a:picLocks noChangeAspect="1" noChangeArrowheads="1"/>
+            </p:cNvPicPr>
+            <p:nvPr/>
+          </p:nvPicPr>
+          <p:blipFill rotWithShape="1">
+            <a:blip r:embed="rId5" cstate="email">
+              <a:extLst>
+                <a:ext uri="{28A0092B-C50C-407E-A947-70E740481C1C}">
+                  <a14:useLocalDpi xmlns:a14="http://schemas.microsoft.com/office/drawing/2010/main"/>
+                </a:ext>
+              </a:extLst>
+            </a:blip>
+            <a:srcRect/>
+            <a:stretch/>
+          </p:blipFill>
+          <p:spPr bwMode="auto">
+            <a:xfrm>
+              <a:off x="10189595" y="4923171"/>
+              <a:ext cx="1484674" cy="1418686"/>
+            </a:xfrm>
+            <a:prstGeom prst="rect">
+              <a:avLst/>
+            </a:prstGeom>
             <a:noFill/>
-          </a:ln>
-        </p:spPr>
-        <p:style>
-          <a:lnRef idx="2">
-            <a:schemeClr val="accent1">
-              <a:shade val="50000"/>
-            </a:schemeClr>
-          </a:lnRef>
-          <a:fillRef idx="1">
-            <a:schemeClr val="accent1"/>
-          </a:fillRef>
-          <a:effectRef idx="0">
-            <a:schemeClr val="accent1"/>
-          </a:effectRef>
-          <a:fontRef idx="minor">
-            <a:schemeClr val="lt1"/>
-          </a:fontRef>
-        </p:style>
-        <p:txBody>
-          <a:bodyPr rtlCol="0" anchor="ctr"/>
-          <a:lstStyle/>
-          <a:p>
-            <a:pPr algn="ctr"/>
-            <a:endParaRPr lang="en-US"/>
-          </a:p>
-        </p:txBody>
-      </p:sp>
-      <p:sp>
-        <p:nvSpPr>
-          <p:cNvPr id="13" name="Rectangle 12">
-            <a:extLst>
-              <a:ext uri="{FF2B5EF4-FFF2-40B4-BE49-F238E27FC236}">
-                <a16:creationId xmlns:a16="http://schemas.microsoft.com/office/drawing/2014/main" id="{282A086F-6910-4F0F-9530-0524BD61E843}"/>
-              </a:ext>
-            </a:extLst>
-          </p:cNvPr>
-          <p:cNvSpPr/>
-          <p:nvPr/>
-        </p:nvSpPr>
-        <p:spPr>
-          <a:xfrm>
-            <a:off x="6596457" y="4608193"/>
-            <a:ext cx="5486400" cy="2200507"/>
-          </a:xfrm>
-          <a:prstGeom prst="rect">
-            <a:avLst/>
-          </a:prstGeom>
-          <a:solidFill>
-            <a:schemeClr val="bg1"/>
-          </a:solidFill>
-          <a:ln>
+            <a:extLst>
+              <a:ext uri="{909E8E84-426E-40DD-AFC4-6F175D3DCCD1}">
+                <a14:hiddenFill xmlns:a14="http://schemas.microsoft.com/office/drawing/2010/main">
+                  <a:solidFill>
+                    <a:srgbClr val="FFFFFF"/>
+                  </a:solidFill>
+                </a14:hiddenFill>
+              </a:ext>
+            </a:extLst>
+          </p:spPr>
+        </p:pic>
+        <p:pic>
+          <p:nvPicPr>
+            <p:cNvPr id="2056" name="Picture 8">
+              <a:extLst>
+                <a:ext uri="{FF2B5EF4-FFF2-40B4-BE49-F238E27FC236}">
+                  <a16:creationId xmlns:a16="http://schemas.microsoft.com/office/drawing/2014/main" id="{D6ADDF5B-3C85-4CA2-822F-15EE4E944551}"/>
+                </a:ext>
+              </a:extLst>
+            </p:cNvPr>
+            <p:cNvPicPr>
+              <a:picLocks noChangeAspect="1" noChangeArrowheads="1"/>
+            </p:cNvPicPr>
+            <p:nvPr/>
+          </p:nvPicPr>
+          <p:blipFill>
+            <a:blip r:embed="rId6" cstate="email">
+              <a:extLst>
+                <a:ext uri="{28A0092B-C50C-407E-A947-70E740481C1C}">
+                  <a14:useLocalDpi xmlns:a14="http://schemas.microsoft.com/office/drawing/2010/main"/>
+                </a:ext>
+              </a:extLst>
+            </a:blip>
+            <a:srcRect/>
+            <a:stretch>
+              <a:fillRect/>
+            </a:stretch>
+          </p:blipFill>
+          <p:spPr bwMode="auto">
+            <a:xfrm>
+              <a:off x="6604820" y="27130"/>
+              <a:ext cx="5486400" cy="2200507"/>
+            </a:xfrm>
+            <a:prstGeom prst="rect">
+              <a:avLst/>
+            </a:prstGeom>
             <a:noFill/>
-          </a:ln>
-        </p:spPr>
-        <p:style>
-          <a:lnRef idx="2">
-            <a:schemeClr val="accent1">
-              <a:shade val="50000"/>
-            </a:schemeClr>
-          </a:lnRef>
-          <a:fillRef idx="1">
-            <a:schemeClr val="accent1"/>
-          </a:fillRef>
-          <a:effectRef idx="0">
-            <a:schemeClr val="accent1"/>
-          </a:effectRef>
-          <a:fontRef idx="minor">
-            <a:schemeClr val="lt1"/>
-          </a:fontRef>
-        </p:style>
-        <p:txBody>
-          <a:bodyPr rtlCol="0" anchor="ctr"/>
-          <a:lstStyle/>
-          <a:p>
-            <a:pPr algn="ctr"/>
-            <a:endParaRPr lang="en-US"/>
-          </a:p>
-        </p:txBody>
-      </p:sp>
-      <p:pic>
-        <p:nvPicPr>
-          <p:cNvPr id="2050" name="Picture 2">
-            <a:extLst>
-              <a:ext uri="{FF2B5EF4-FFF2-40B4-BE49-F238E27FC236}">
-                <a16:creationId xmlns:a16="http://schemas.microsoft.com/office/drawing/2014/main" id="{9192433C-CA9C-4641-ADBB-AF35F2A56FB7}"/>
-              </a:ext>
-            </a:extLst>
-          </p:cNvPr>
-          <p:cNvPicPr>
-            <a:picLocks noChangeAspect="1" noChangeArrowheads="1"/>
-          </p:cNvPicPr>
-          <p:nvPr/>
-        </p:nvPicPr>
-        <p:blipFill>
-          <a:blip r:embed="rId3" cstate="email">
-            <a:extLst>
-              <a:ext uri="{28A0092B-C50C-407E-A947-70E740481C1C}">
-                <a14:useLocalDpi xmlns:a14="http://schemas.microsoft.com/office/drawing/2010/main"/>
-              </a:ext>
-            </a:extLst>
-          </a:blip>
-          <a:srcRect/>
-          <a:stretch>
-            <a:fillRect/>
-          </a:stretch>
-        </p:blipFill>
-        <p:spPr bwMode="auto">
-          <a:xfrm>
-            <a:off x="6604820" y="2358865"/>
-            <a:ext cx="5486400" cy="2200507"/>
-          </a:xfrm>
-          <a:prstGeom prst="rect">
-            <a:avLst/>
-          </a:prstGeom>
-          <a:noFill/>
-          <a:extLst>
-            <a:ext uri="{909E8E84-426E-40DD-AFC4-6F175D3DCCD1}">
-              <a14:hiddenFill xmlns:a14="http://schemas.microsoft.com/office/drawing/2010/main">
-                <a:solidFill>
-                  <a:srgbClr val="FFFFFF"/>
-                </a:solidFill>
-              </a14:hiddenFill>
-            </a:ext>
-          </a:extLst>
-        </p:spPr>
-      </p:pic>
-      <p:pic>
-        <p:nvPicPr>
-          <p:cNvPr id="2054" name="Picture 6">
-            <a:extLst>
-              <a:ext uri="{FF2B5EF4-FFF2-40B4-BE49-F238E27FC236}">
-                <a16:creationId xmlns:a16="http://schemas.microsoft.com/office/drawing/2014/main" id="{3BFC11C0-9C31-40BD-B3D0-04F89E7091BB}"/>
-              </a:ext>
-            </a:extLst>
-          </p:cNvPr>
-          <p:cNvPicPr>
-            <a:picLocks noChangeAspect="1" noChangeArrowheads="1"/>
-          </p:cNvPicPr>
-          <p:nvPr/>
-        </p:nvPicPr>
-        <p:blipFill>
-          <a:blip r:embed="rId4" cstate="email">
-            <a:extLst>
-              <a:ext uri="{28A0092B-C50C-407E-A947-70E740481C1C}">
-                <a14:useLocalDpi xmlns:a14="http://schemas.microsoft.com/office/drawing/2010/main"/>
-              </a:ext>
-            </a:extLst>
-          </a:blip>
-          <a:srcRect/>
-          <a:stretch>
-            <a:fillRect/>
-          </a:stretch>
-        </p:blipFill>
-        <p:spPr bwMode="auto">
-          <a:xfrm>
-            <a:off x="6604820" y="4623701"/>
-            <a:ext cx="5486400" cy="2200507"/>
-          </a:xfrm>
-          <a:prstGeom prst="rect">
-            <a:avLst/>
-          </a:prstGeom>
-          <a:noFill/>
-          <a:extLst>
-            <a:ext uri="{909E8E84-426E-40DD-AFC4-6F175D3DCCD1}">
-              <a14:hiddenFill xmlns:a14="http://schemas.microsoft.com/office/drawing/2010/main">
-                <a:solidFill>
-                  <a:srgbClr val="FFFFFF"/>
-                </a:solidFill>
-              </a14:hiddenFill>
-            </a:ext>
-          </a:extLst>
-        </p:spPr>
-      </p:pic>
-      <p:pic>
-        <p:nvPicPr>
-          <p:cNvPr id="22" name="Picture 8">
-            <a:extLst>
-              <a:ext uri="{FF2B5EF4-FFF2-40B4-BE49-F238E27FC236}">
-                <a16:creationId xmlns:a16="http://schemas.microsoft.com/office/drawing/2014/main" id="{477E9EA0-6424-4D76-AF8D-FAE95F0F2051}"/>
-              </a:ext>
-            </a:extLst>
-          </p:cNvPr>
-          <p:cNvPicPr>
-            <a:picLocks noChangeAspect="1" noChangeArrowheads="1"/>
-          </p:cNvPicPr>
-          <p:nvPr/>
-        </p:nvPicPr>
-        <p:blipFill rotWithShape="1">
-          <a:blip r:embed="rId5" cstate="email">
-            <a:extLst>
-              <a:ext uri="{28A0092B-C50C-407E-A947-70E740481C1C}">
-                <a14:useLocalDpi xmlns:a14="http://schemas.microsoft.com/office/drawing/2010/main"/>
-              </a:ext>
-            </a:extLst>
-          </a:blip>
-          <a:srcRect/>
-          <a:stretch/>
-        </p:blipFill>
-        <p:spPr bwMode="auto">
-          <a:xfrm>
-            <a:off x="10189595" y="4923171"/>
-            <a:ext cx="1484674" cy="1418686"/>
-          </a:xfrm>
-          <a:prstGeom prst="rect">
-            <a:avLst/>
-          </a:prstGeom>
-          <a:noFill/>
-          <a:extLst>
-            <a:ext uri="{909E8E84-426E-40DD-AFC4-6F175D3DCCD1}">
-              <a14:hiddenFill xmlns:a14="http://schemas.microsoft.com/office/drawing/2010/main">
-                <a:solidFill>
-                  <a:srgbClr val="FFFFFF"/>
-                </a:solidFill>
-              </a14:hiddenFill>
-            </a:ext>
-          </a:extLst>
-        </p:spPr>
-      </p:pic>
-      <p:pic>
-        <p:nvPicPr>
-          <p:cNvPr id="2056" name="Picture 8">
-            <a:extLst>
-              <a:ext uri="{FF2B5EF4-FFF2-40B4-BE49-F238E27FC236}">
-                <a16:creationId xmlns:a16="http://schemas.microsoft.com/office/drawing/2014/main" id="{D6ADDF5B-3C85-4CA2-822F-15EE4E944551}"/>
-              </a:ext>
-            </a:extLst>
-          </p:cNvPr>
-          <p:cNvPicPr>
-            <a:picLocks noChangeAspect="1" noChangeArrowheads="1"/>
-          </p:cNvPicPr>
-          <p:nvPr/>
-        </p:nvPicPr>
-        <p:blipFill>
-          <a:blip r:embed="rId6" cstate="email">
-            <a:extLst>
-              <a:ext uri="{28A0092B-C50C-407E-A947-70E740481C1C}">
-                <a14:useLocalDpi xmlns:a14="http://schemas.microsoft.com/office/drawing/2010/main"/>
-              </a:ext>
-            </a:extLst>
-          </a:blip>
-          <a:srcRect/>
-          <a:stretch>
-            <a:fillRect/>
-          </a:stretch>
-        </p:blipFill>
-        <p:spPr bwMode="auto">
-          <a:xfrm>
-            <a:off x="6604820" y="27130"/>
-            <a:ext cx="5486400" cy="2200507"/>
-          </a:xfrm>
-          <a:prstGeom prst="rect">
-            <a:avLst/>
-          </a:prstGeom>
-          <a:noFill/>
-          <a:extLst>
-            <a:ext uri="{909E8E84-426E-40DD-AFC4-6F175D3DCCD1}">
-              <a14:hiddenFill xmlns:a14="http://schemas.microsoft.com/office/drawing/2010/main">
-                <a:solidFill>
-                  <a:srgbClr val="FFFFFF"/>
-                </a:solidFill>
-              </a14:hiddenFill>
-            </a:ext>
-          </a:extLst>
-        </p:spPr>
-      </p:pic>
+            <a:extLst>
+              <a:ext uri="{909E8E84-426E-40DD-AFC4-6F175D3DCCD1}">
+                <a14:hiddenFill xmlns:a14="http://schemas.microsoft.com/office/drawing/2010/main">
+                  <a:solidFill>
+                    <a:srgbClr val="FFFFFF"/>
+                  </a:solidFill>
+                </a14:hiddenFill>
+              </a:ext>
+            </a:extLst>
+          </p:spPr>
+        </p:pic>
+        <p:sp>
+          <p:nvSpPr>
+            <p:cNvPr id="6" name="TextBox 5">
+              <a:extLst>
+                <a:ext uri="{FF2B5EF4-FFF2-40B4-BE49-F238E27FC236}">
+                  <a16:creationId xmlns:a16="http://schemas.microsoft.com/office/drawing/2014/main" id="{E7C17334-4D84-4971-8A72-6FACAC90BF38}"/>
+                </a:ext>
+              </a:extLst>
+            </p:cNvPr>
+            <p:cNvSpPr txBox="1"/>
+            <p:nvPr/>
+          </p:nvSpPr>
+          <p:spPr>
+            <a:xfrm>
+              <a:off x="7225664" y="272043"/>
+              <a:ext cx="675185" cy="430887"/>
+            </a:xfrm>
+            <a:prstGeom prst="rect">
+              <a:avLst/>
+            </a:prstGeom>
+            <a:noFill/>
+          </p:spPr>
+          <p:txBody>
+            <a:bodyPr wrap="none" rtlCol="0">
+              <a:spAutoFit/>
+            </a:bodyPr>
+            <a:lstStyle/>
+            <a:p>
+              <a:r>
+                <a:rPr lang="en-US" sz="2200" b="1" dirty="0"/>
+                <a:t>30%</a:t>
+              </a:r>
+            </a:p>
+          </p:txBody>
+        </p:sp>
+        <p:sp>
+          <p:nvSpPr>
+            <p:cNvPr id="7" name="TextBox 6">
+              <a:extLst>
+                <a:ext uri="{FF2B5EF4-FFF2-40B4-BE49-F238E27FC236}">
+                  <a16:creationId xmlns:a16="http://schemas.microsoft.com/office/drawing/2014/main" id="{7AAAA089-DB3D-4194-998A-08B9EDDEF6B5}"/>
+                </a:ext>
+              </a:extLst>
+            </p:cNvPr>
+            <p:cNvSpPr txBox="1"/>
+            <p:nvPr/>
+          </p:nvSpPr>
+          <p:spPr>
+            <a:xfrm>
+              <a:off x="7247433" y="2561396"/>
+              <a:ext cx="675185" cy="430887"/>
+            </a:xfrm>
+            <a:prstGeom prst="rect">
+              <a:avLst/>
+            </a:prstGeom>
+            <a:noFill/>
+          </p:spPr>
+          <p:txBody>
+            <a:bodyPr wrap="none" rtlCol="0">
+              <a:spAutoFit/>
+            </a:bodyPr>
+            <a:lstStyle/>
+            <a:p>
+              <a:r>
+                <a:rPr lang="en-US" sz="2200" b="1" dirty="0"/>
+                <a:t>60%</a:t>
+              </a:r>
+            </a:p>
+          </p:txBody>
+        </p:sp>
+        <p:sp>
+          <p:nvSpPr>
+            <p:cNvPr id="8" name="TextBox 7">
+              <a:extLst>
+                <a:ext uri="{FF2B5EF4-FFF2-40B4-BE49-F238E27FC236}">
+                  <a16:creationId xmlns:a16="http://schemas.microsoft.com/office/drawing/2014/main" id="{B7C09CFD-6804-44BE-8A3C-0EF59E8E09EF}"/>
+                </a:ext>
+              </a:extLst>
+            </p:cNvPr>
+            <p:cNvSpPr txBox="1"/>
+            <p:nvPr/>
+          </p:nvSpPr>
+          <p:spPr>
+            <a:xfrm>
+              <a:off x="7225663" y="4855204"/>
+              <a:ext cx="675185" cy="430887"/>
+            </a:xfrm>
+            <a:prstGeom prst="rect">
+              <a:avLst/>
+            </a:prstGeom>
+            <a:noFill/>
+          </p:spPr>
+          <p:txBody>
+            <a:bodyPr wrap="none" rtlCol="0">
+              <a:spAutoFit/>
+            </a:bodyPr>
+            <a:lstStyle/>
+            <a:p>
+              <a:r>
+                <a:rPr lang="en-US" sz="2200" b="1" dirty="0"/>
+                <a:t>90%</a:t>
+              </a:r>
+            </a:p>
+          </p:txBody>
+        </p:sp>
+      </p:grpSp>
     </p:spTree>
     <p:extLst>
       <p:ext uri="{BB962C8B-B14F-4D97-AF65-F5344CB8AC3E}">
@@ -8407,10 +8827,10 @@
       </p:pic>
       <p:pic>
         <p:nvPicPr>
-          <p:cNvPr id="5" name="Picture 4" descr="Scatter chart&#10;&#10;Description automatically generated">
-            <a:extLst>
-              <a:ext uri="{FF2B5EF4-FFF2-40B4-BE49-F238E27FC236}">
-                <a16:creationId xmlns:a16="http://schemas.microsoft.com/office/drawing/2014/main" id="{913B371D-E9D1-49B6-910C-4B6E85F9C83E}"/>
+          <p:cNvPr id="5" name="Picture 4" descr="A picture containing background pattern&#10;&#10;Description automatically generated">
+            <a:extLst>
+              <a:ext uri="{FF2B5EF4-FFF2-40B4-BE49-F238E27FC236}">
+                <a16:creationId xmlns:a16="http://schemas.microsoft.com/office/drawing/2014/main" id="{59FAE4AA-6C9E-4013-BD34-6B51AA5BEC85}"/>
               </a:ext>
             </a:extLst>
           </p:cNvPr>
@@ -8427,8 +8847,8 @@
         </p:blipFill>
         <p:spPr>
           <a:xfrm>
-            <a:off x="6978253" y="978198"/>
-            <a:ext cx="4389120" cy="4389120"/>
+            <a:off x="7030402" y="1039496"/>
+            <a:ext cx="4323397" cy="4323397"/>
           </a:xfrm>
           <a:prstGeom prst="rect">
             <a:avLst/>
@@ -8550,114 +8970,135 @@
           </a:p>
         </p:txBody>
       </p:sp>
-      <p:pic>
-        <p:nvPicPr>
-          <p:cNvPr id="5" name="Picture 4">
-            <a:extLst>
-              <a:ext uri="{FF2B5EF4-FFF2-40B4-BE49-F238E27FC236}">
-                <a16:creationId xmlns:a16="http://schemas.microsoft.com/office/drawing/2014/main" id="{F9C52E1B-D45C-4EDC-8FB0-B67C4F9CEA70}"/>
-              </a:ext>
-            </a:extLst>
-          </p:cNvPr>
-          <p:cNvPicPr>
-            <a:picLocks noChangeAspect="1"/>
-          </p:cNvPicPr>
+      <p:grpSp>
+        <p:nvGrpSpPr>
+          <p:cNvPr id="4" name="Group 3">
+            <a:extLst>
+              <a:ext uri="{FF2B5EF4-FFF2-40B4-BE49-F238E27FC236}">
+                <a16:creationId xmlns:a16="http://schemas.microsoft.com/office/drawing/2014/main" id="{39DDF6A0-3115-482D-85BF-14C288C02A0D}"/>
+              </a:ext>
+            </a:extLst>
+          </p:cNvPr>
+          <p:cNvGrpSpPr/>
           <p:nvPr/>
-        </p:nvPicPr>
-        <p:blipFill>
-          <a:blip r:embed="rId2" cstate="email">
-            <a:extLst>
-              <a:ext uri="{28A0092B-C50C-407E-A947-70E740481C1C}">
-                <a14:useLocalDpi xmlns:a14="http://schemas.microsoft.com/office/drawing/2010/main"/>
-              </a:ext>
-            </a:extLst>
-          </a:blip>
-          <a:stretch>
-            <a:fillRect/>
-          </a:stretch>
-        </p:blipFill>
-        <p:spPr>
+        </p:nvGrpSpPr>
+        <p:grpSpPr>
           <a:xfrm>
-            <a:off x="5531005" y="386376"/>
-            <a:ext cx="6660995" cy="5654004"/>
+            <a:off x="96876" y="386376"/>
+            <a:ext cx="12095124" cy="6367197"/>
+            <a:chOff x="96876" y="386376"/>
+            <a:chExt cx="12095124" cy="6367197"/>
           </a:xfrm>
-          <a:prstGeom prst="rect">
-            <a:avLst/>
-          </a:prstGeom>
-        </p:spPr>
-      </p:pic>
-      <p:pic>
-        <p:nvPicPr>
-          <p:cNvPr id="6" name="Picture 5">
-            <a:extLst>
-              <a:ext uri="{FF2B5EF4-FFF2-40B4-BE49-F238E27FC236}">
-                <a16:creationId xmlns:a16="http://schemas.microsoft.com/office/drawing/2014/main" id="{9CB85514-9639-46D0-A403-F51AAA95BBA4}"/>
-              </a:ext>
-            </a:extLst>
-          </p:cNvPr>
-          <p:cNvPicPr>
-            <a:picLocks noChangeAspect="1"/>
-          </p:cNvPicPr>
-          <p:nvPr/>
-        </p:nvPicPr>
-        <p:blipFill>
-          <a:blip r:embed="rId3" cstate="email">
-            <a:extLst>
-              <a:ext uri="{28A0092B-C50C-407E-A947-70E740481C1C}">
-                <a14:useLocalDpi xmlns:a14="http://schemas.microsoft.com/office/drawing/2010/main"/>
-              </a:ext>
-            </a:extLst>
-          </a:blip>
-          <a:stretch>
-            <a:fillRect/>
-          </a:stretch>
-        </p:blipFill>
-        <p:spPr>
-          <a:xfrm>
-            <a:off x="3541026" y="1528824"/>
-            <a:ext cx="4283113" cy="3800351"/>
-          </a:xfrm>
-          <a:prstGeom prst="rect">
-            <a:avLst/>
-          </a:prstGeom>
-        </p:spPr>
-      </p:pic>
-      <p:pic>
-        <p:nvPicPr>
-          <p:cNvPr id="7" name="Picture 6">
-            <a:extLst>
-              <a:ext uri="{FF2B5EF4-FFF2-40B4-BE49-F238E27FC236}">
-                <a16:creationId xmlns:a16="http://schemas.microsoft.com/office/drawing/2014/main" id="{772BD68D-389D-498F-9517-FC93B6A628B9}"/>
-              </a:ext>
-            </a:extLst>
-          </p:cNvPr>
-          <p:cNvPicPr>
-            <a:picLocks noChangeAspect="1"/>
-          </p:cNvPicPr>
-          <p:nvPr/>
-        </p:nvPicPr>
-        <p:blipFill>
-          <a:blip r:embed="rId4" cstate="email">
-            <a:extLst>
-              <a:ext uri="{28A0092B-C50C-407E-A947-70E740481C1C}">
-                <a14:useLocalDpi xmlns:a14="http://schemas.microsoft.com/office/drawing/2010/main"/>
-              </a:ext>
-            </a:extLst>
-          </a:blip>
-          <a:stretch>
-            <a:fillRect/>
-          </a:stretch>
-        </p:blipFill>
-        <p:spPr>
-          <a:xfrm>
-            <a:off x="96876" y="3573077"/>
-            <a:ext cx="4608474" cy="3180496"/>
-          </a:xfrm>
-          <a:prstGeom prst="rect">
-            <a:avLst/>
-          </a:prstGeom>
-        </p:spPr>
-      </p:pic>
+        </p:grpSpPr>
+        <p:pic>
+          <p:nvPicPr>
+            <p:cNvPr id="5" name="Picture 4">
+              <a:extLst>
+                <a:ext uri="{FF2B5EF4-FFF2-40B4-BE49-F238E27FC236}">
+                  <a16:creationId xmlns:a16="http://schemas.microsoft.com/office/drawing/2014/main" id="{F9C52E1B-D45C-4EDC-8FB0-B67C4F9CEA70}"/>
+                </a:ext>
+              </a:extLst>
+            </p:cNvPr>
+            <p:cNvPicPr>
+              <a:picLocks noChangeAspect="1"/>
+            </p:cNvPicPr>
+            <p:nvPr/>
+          </p:nvPicPr>
+          <p:blipFill>
+            <a:blip r:embed="rId2" cstate="email">
+              <a:extLst>
+                <a:ext uri="{28A0092B-C50C-407E-A947-70E740481C1C}">
+                  <a14:useLocalDpi xmlns:a14="http://schemas.microsoft.com/office/drawing/2010/main"/>
+                </a:ext>
+              </a:extLst>
+            </a:blip>
+            <a:stretch>
+              <a:fillRect/>
+            </a:stretch>
+          </p:blipFill>
+          <p:spPr>
+            <a:xfrm>
+              <a:off x="5531005" y="386376"/>
+              <a:ext cx="6660995" cy="5654004"/>
+            </a:xfrm>
+            <a:prstGeom prst="rect">
+              <a:avLst/>
+            </a:prstGeom>
+          </p:spPr>
+        </p:pic>
+        <p:pic>
+          <p:nvPicPr>
+            <p:cNvPr id="6" name="Picture 5">
+              <a:extLst>
+                <a:ext uri="{FF2B5EF4-FFF2-40B4-BE49-F238E27FC236}">
+                  <a16:creationId xmlns:a16="http://schemas.microsoft.com/office/drawing/2014/main" id="{9CB85514-9639-46D0-A403-F51AAA95BBA4}"/>
+                </a:ext>
+              </a:extLst>
+            </p:cNvPr>
+            <p:cNvPicPr>
+              <a:picLocks noChangeAspect="1"/>
+            </p:cNvPicPr>
+            <p:nvPr/>
+          </p:nvPicPr>
+          <p:blipFill>
+            <a:blip r:embed="rId3" cstate="email">
+              <a:extLst>
+                <a:ext uri="{28A0092B-C50C-407E-A947-70E740481C1C}">
+                  <a14:useLocalDpi xmlns:a14="http://schemas.microsoft.com/office/drawing/2010/main"/>
+                </a:ext>
+              </a:extLst>
+            </a:blip>
+            <a:stretch>
+              <a:fillRect/>
+            </a:stretch>
+          </p:blipFill>
+          <p:spPr>
+            <a:xfrm>
+              <a:off x="3541026" y="1528824"/>
+              <a:ext cx="4283113" cy="3800351"/>
+            </a:xfrm>
+            <a:prstGeom prst="rect">
+              <a:avLst/>
+            </a:prstGeom>
+          </p:spPr>
+        </p:pic>
+        <p:pic>
+          <p:nvPicPr>
+            <p:cNvPr id="7" name="Picture 6">
+              <a:extLst>
+                <a:ext uri="{FF2B5EF4-FFF2-40B4-BE49-F238E27FC236}">
+                  <a16:creationId xmlns:a16="http://schemas.microsoft.com/office/drawing/2014/main" id="{772BD68D-389D-498F-9517-FC93B6A628B9}"/>
+                </a:ext>
+              </a:extLst>
+            </p:cNvPr>
+            <p:cNvPicPr>
+              <a:picLocks noChangeAspect="1"/>
+            </p:cNvPicPr>
+            <p:nvPr/>
+          </p:nvPicPr>
+          <p:blipFill>
+            <a:blip r:embed="rId4" cstate="email">
+              <a:extLst>
+                <a:ext uri="{28A0092B-C50C-407E-A947-70E740481C1C}">
+                  <a14:useLocalDpi xmlns:a14="http://schemas.microsoft.com/office/drawing/2010/main"/>
+                </a:ext>
+              </a:extLst>
+            </a:blip>
+            <a:stretch>
+              <a:fillRect/>
+            </a:stretch>
+          </p:blipFill>
+          <p:spPr>
+            <a:xfrm>
+              <a:off x="96876" y="3573077"/>
+              <a:ext cx="4608474" cy="3180496"/>
+            </a:xfrm>
+            <a:prstGeom prst="rect">
+              <a:avLst/>
+            </a:prstGeom>
+          </p:spPr>
+        </p:pic>
+      </p:grpSp>
       <p:sp>
         <p:nvSpPr>
           <p:cNvPr id="8" name="Title 1">
@@ -9169,19 +9610,17 @@
       </p:sp>
       <p:pic>
         <p:nvPicPr>
-          <p:cNvPr id="13" name="Content Placeholder 12" descr="Chart, scatter chart&#10;&#10;Description automatically generated">
-            <a:extLst>
-              <a:ext uri="{FF2B5EF4-FFF2-40B4-BE49-F238E27FC236}">
-                <a16:creationId xmlns:a16="http://schemas.microsoft.com/office/drawing/2014/main" id="{4A48C664-1524-44D4-A86C-232593386ABE}"/>
+          <p:cNvPr id="12" name="Picture 11" descr="Chart, scatter chart&#10;&#10;Description automatically generated">
+            <a:extLst>
+              <a:ext uri="{FF2B5EF4-FFF2-40B4-BE49-F238E27FC236}">
+                <a16:creationId xmlns:a16="http://schemas.microsoft.com/office/drawing/2014/main" id="{82079490-5851-4BF7-B672-D7A606548E38}"/>
               </a:ext>
             </a:extLst>
           </p:cNvPr>
           <p:cNvPicPr>
-            <a:picLocks noGrp="1" noChangeAspect="1"/>
+            <a:picLocks noChangeAspect="1"/>
           </p:cNvPicPr>
-          <p:nvPr>
-            <p:ph sz="half" idx="2"/>
-          </p:nvPr>
+          <p:nvPr/>
         </p:nvPicPr>
         <p:blipFill>
           <a:blip r:link="rId3"/>
@@ -9191,9 +9630,12 @@
         </p:blipFill>
         <p:spPr>
           <a:xfrm>
-            <a:off x="7002462" y="1027906"/>
-            <a:ext cx="4351338" cy="4351338"/>
+            <a:off x="7015575" y="1041019"/>
+            <a:ext cx="4325112" cy="4325112"/>
           </a:xfrm>
+          <a:prstGeom prst="rect">
+            <a:avLst/>
+          </a:prstGeom>
         </p:spPr>
       </p:pic>
       <p:pic>
@@ -11839,11 +12281,11 @@
           <a:p>
             <a:r>
               <a:rPr lang="en-US" sz="4400" dirty="0"/>
-              <a:t>Simulation specific </a:t>
+              <a:t>Infinite choice in parameters</a:t>
             </a:r>
             <a:r>
               <a:rPr lang="en-US" dirty="0"/>
-              <a:t>parameters:</a:t>
+              <a:t>:</a:t>
             </a:r>
             <a:br>
               <a:rPr lang="en-US" dirty="0"/>
@@ -11888,7 +12330,7 @@
             </a:pPr>
             <a:r>
               <a:rPr lang="en-US" sz="2800" dirty="0"/>
-              <a:t>Parameters:</a:t>
+              <a:t>Possible parameters:</a:t>
             </a:r>
           </a:p>
           <a:p>
@@ -11929,12 +12371,9 @@
           <a:p>
             <a:r>
               <a:rPr lang="en-US" dirty="0"/>
-              <a:t>E</a:t>
-            </a:r>
-            <a:r>
-              <a:rPr lang="en-US" sz="2800" dirty="0"/>
-              <a:t>nvironmental features</a:t>
-            </a:r>
+              <a:t>Hospitalization rate</a:t>
+            </a:r>
+            <a:endParaRPr lang="en-US" sz="2800" dirty="0"/>
           </a:p>
           <a:p>
             <a:r>
@@ -12167,7 +12606,7 @@
           <a:p>
             <a:r>
               <a:rPr lang="en-US" dirty="0"/>
-              <a:t>Health and recovered</a:t>
+              <a:t>Healthy and recovered</a:t>
             </a:r>
           </a:p>
           <a:p>
@@ -12327,10 +12766,10 @@
       </p:sp>
       <p:pic>
         <p:nvPicPr>
-          <p:cNvPr id="14" name="Picture 13" descr="Chart, scatter chart&#10;&#10;Description automatically generated">
-            <a:extLst>
-              <a:ext uri="{FF2B5EF4-FFF2-40B4-BE49-F238E27FC236}">
-                <a16:creationId xmlns:a16="http://schemas.microsoft.com/office/drawing/2014/main" id="{96E808C9-8A5C-4B89-92C7-2642EE4B601B}"/>
+          <p:cNvPr id="5" name="Picture 4" descr="Chart, scatter chart&#10;&#10;Description automatically generated">
+            <a:extLst>
+              <a:ext uri="{FF2B5EF4-FFF2-40B4-BE49-F238E27FC236}">
+                <a16:creationId xmlns:a16="http://schemas.microsoft.com/office/drawing/2014/main" id="{1374EE70-51DA-414D-8780-CEB8965F4D5C}"/>
               </a:ext>
             </a:extLst>
           </p:cNvPr>
@@ -12347,7 +12786,7 @@
         </p:blipFill>
         <p:spPr>
           <a:xfrm>
-            <a:off x="91111" y="3523395"/>
+            <a:off x="125659" y="3570078"/>
             <a:ext cx="3200400" cy="3200400"/>
           </a:xfrm>
           <a:prstGeom prst="rect">
@@ -12357,10 +12796,10 @@
       </p:pic>
       <p:pic>
         <p:nvPicPr>
-          <p:cNvPr id="17" name="Picture 16" descr="Chart, scatter chart&#10;&#10;Description automatically generated">
-            <a:extLst>
-              <a:ext uri="{FF2B5EF4-FFF2-40B4-BE49-F238E27FC236}">
-                <a16:creationId xmlns:a16="http://schemas.microsoft.com/office/drawing/2014/main" id="{71059A9C-70CA-4F63-AF1C-3A7CC7365CBF}"/>
+          <p:cNvPr id="10" name="Picture 9" descr="Chart, scatter chart&#10;&#10;Description automatically generated">
+            <a:extLst>
+              <a:ext uri="{FF2B5EF4-FFF2-40B4-BE49-F238E27FC236}">
+                <a16:creationId xmlns:a16="http://schemas.microsoft.com/office/drawing/2014/main" id="{F970F7F6-B01F-444B-9439-910B9848F1F1}"/>
               </a:ext>
             </a:extLst>
           </p:cNvPr>
@@ -12377,7 +12816,7 @@
         </p:blipFill>
         <p:spPr>
           <a:xfrm>
-            <a:off x="3452707" y="3523395"/>
+            <a:off x="3478290" y="3570078"/>
             <a:ext cx="3200400" cy="3200400"/>
           </a:xfrm>
           <a:prstGeom prst="rect">
@@ -12387,10 +12826,10 @@
       </p:pic>
       <p:pic>
         <p:nvPicPr>
-          <p:cNvPr id="20" name="Picture 19" descr="A picture containing qr code&#10;&#10;Description automatically generated">
-            <a:extLst>
-              <a:ext uri="{FF2B5EF4-FFF2-40B4-BE49-F238E27FC236}">
-                <a16:creationId xmlns:a16="http://schemas.microsoft.com/office/drawing/2014/main" id="{1846DB6A-608F-4FED-A6A9-04AD90231D4B}"/>
+          <p:cNvPr id="12" name="Picture 11" descr="A picture containing qr code&#10;&#10;Description automatically generated">
+            <a:extLst>
+              <a:ext uri="{FF2B5EF4-FFF2-40B4-BE49-F238E27FC236}">
+                <a16:creationId xmlns:a16="http://schemas.microsoft.com/office/drawing/2014/main" id="{88385FC5-09EC-4F5D-B1D2-661600476FED}"/>
               </a:ext>
             </a:extLst>
           </p:cNvPr>
@@ -12407,7 +12846,7 @@
         </p:blipFill>
         <p:spPr>
           <a:xfrm>
-            <a:off x="6831323" y="3523395"/>
+            <a:off x="6839981" y="3545887"/>
             <a:ext cx="3200400" cy="3200400"/>
           </a:xfrm>
           <a:prstGeom prst="rect">
@@ -12443,7 +12882,7 @@
           <a:p>
             <a:r>
               <a:rPr lang="en-US" sz="4400" dirty="0"/>
-              <a:t>Setting up a Simulation</a:t>
+              <a:t>Setting up a simulation</a:t>
             </a:r>
             <a:endParaRPr lang="en-US" dirty="0"/>
           </a:p>
@@ -12747,21 +13186,23 @@
         </p:nvSpPr>
         <p:spPr>
           <a:xfrm>
-            <a:off x="1233884" y="474662"/>
-            <a:ext cx="8367316" cy="1325563"/>
+            <a:off x="1233883" y="474662"/>
+            <a:ext cx="10270931" cy="1325563"/>
           </a:xfrm>
         </p:spPr>
         <p:txBody>
-          <a:bodyPr/>
+          <a:bodyPr>
+            <a:normAutofit fontScale="90000"/>
+          </a:bodyPr>
           <a:lstStyle/>
           <a:p>
             <a:r>
-              <a:rPr lang="en-US" sz="4400" dirty="0"/>
-              <a:t>Question: What actions can affect diseas</a:t>
+              <a:rPr lang="en-US" sz="5400" dirty="0"/>
+              <a:t>Constraining parameters with reality</a:t>
             </a:r>
             <a:r>
               <a:rPr lang="en-US" dirty="0"/>
-              <a:t>e spread in a population</a:t>
+              <a:t>:</a:t>
             </a:r>
           </a:p>
         </p:txBody>
@@ -13209,10 +13650,10 @@
       </p:sp>
       <p:pic>
         <p:nvPicPr>
-          <p:cNvPr id="5" name="Picture 4" descr="Chart&#10;&#10;Description automatically generated">
-            <a:extLst>
-              <a:ext uri="{FF2B5EF4-FFF2-40B4-BE49-F238E27FC236}">
-                <a16:creationId xmlns:a16="http://schemas.microsoft.com/office/drawing/2014/main" id="{37A84418-FDEA-4A3A-8C53-33CB72F6B81A}"/>
+          <p:cNvPr id="4" name="Picture 3" descr="Chart&#10;&#10;Description automatically generated">
+            <a:extLst>
+              <a:ext uri="{FF2B5EF4-FFF2-40B4-BE49-F238E27FC236}">
+                <a16:creationId xmlns:a16="http://schemas.microsoft.com/office/drawing/2014/main" id="{A665C6FC-04D7-458B-B581-74C2E2923680}"/>
               </a:ext>
             </a:extLst>
           </p:cNvPr>
@@ -13229,8 +13670,8 @@
         </p:blipFill>
         <p:spPr>
           <a:xfrm>
-            <a:off x="200978" y="779377"/>
-            <a:ext cx="11747182" cy="5873591"/>
+            <a:off x="338138" y="889122"/>
+            <a:ext cx="11564302" cy="5782151"/>
           </a:xfrm>
           <a:prstGeom prst="rect">
             <a:avLst/>

</xml_diff>